<commit_message>
First DRAFT we'll review this evening.
</commit_message>
<xml_diff>
--- a/src/articles/progressive-exposure-cost.pptx
+++ b/src/articles/progressive-exposure-cost.pptx
@@ -5,16 +5,18 @@
     <p:sldMasterId id="2147484542" r:id="rId1"/>
   </p:sldMasterIdLst>
   <p:notesMasterIdLst>
-    <p:notesMasterId r:id="rId6"/>
+    <p:notesMasterId r:id="rId8"/>
   </p:notesMasterIdLst>
   <p:handoutMasterIdLst>
-    <p:handoutMasterId r:id="rId7"/>
+    <p:handoutMasterId r:id="rId9"/>
   </p:handoutMasterIdLst>
   <p:sldIdLst>
     <p:sldId id="257" r:id="rId2"/>
     <p:sldId id="258" r:id="rId3"/>
     <p:sldId id="259" r:id="rId4"/>
     <p:sldId id="1696" r:id="rId5"/>
+    <p:sldId id="1697" r:id="rId6"/>
+    <p:sldId id="1699" r:id="rId7"/>
   </p:sldIdLst>
   <p:sldSz cx="12436475" cy="6994525"/>
   <p:notesSz cx="7077075" cy="8520113"/>
@@ -235,7 +237,7 @@
               <a:rPr lang="en-US" smtClean="0">
                 <a:latin typeface="Segoe UI" pitchFamily="34" charset="0"/>
               </a:rPr>
-              <a:t>6/28/2018 6:39 PM</a:t>
+              <a:t>6/28/2018 9:38 PM</a:t>
             </a:fld>
             <a:endParaRPr lang="en-US" dirty="0">
               <a:latin typeface="Segoe UI" pitchFamily="34" charset="0"/>
@@ -413,7 +415,7 @@
           <a:p>
             <a:fld id="{D18B56EA-E28F-4F92-9F16-7A6F2501B303}" type="datetime8">
               <a:rPr lang="en-US" smtClean="0"/>
-              <a:t>6/28/2018 6:39 PM</a:t>
+              <a:t>6/28/2018 9:37 PM</a:t>
             </a:fld>
             <a:endParaRPr lang="en-US" dirty="0"/>
           </a:p>
@@ -796,7 +798,7 @@
           <a:p>
             <a:fld id="{D18B56EA-E28F-4F92-9F16-7A6F2501B303}" type="datetime8">
               <a:rPr lang="en-US" smtClean="0"/>
-              <a:t>6/28/2018 6:39 PM</a:t>
+              <a:t>6/28/2018 9:38 PM</a:t>
             </a:fld>
             <a:endParaRPr lang="en-US" dirty="0"/>
           </a:p>
@@ -830,6 +832,187 @@
     <p:extLst>
       <p:ext uri="{BB962C8B-B14F-4D97-AF65-F5344CB8AC3E}">
         <p14:creationId xmlns:p14="http://schemas.microsoft.com/office/powerpoint/2010/main" val="2386601118"/>
+      </p:ext>
+    </p:extLst>
+  </p:cSld>
+  <p:clrMapOvr>
+    <a:masterClrMapping/>
+  </p:clrMapOvr>
+</p:notes>
+</file>
+
+<file path=ppt/notesSlides/notesSlide2.xml><?xml version="1.0" encoding="utf-8"?>
+<p:notes xmlns:a="http://schemas.openxmlformats.org/drawingml/2006/main" xmlns:r="http://schemas.openxmlformats.org/officeDocument/2006/relationships" xmlns:p="http://schemas.openxmlformats.org/presentationml/2006/main">
+  <p:cSld>
+    <p:spTree>
+      <p:nvGrpSpPr>
+        <p:cNvPr id="1" name=""/>
+        <p:cNvGrpSpPr/>
+        <p:nvPr/>
+      </p:nvGrpSpPr>
+      <p:grpSpPr>
+        <a:xfrm>
+          <a:off x="0" y="0"/>
+          <a:ext cx="0" cy="0"/>
+          <a:chOff x="0" y="0"/>
+          <a:chExt cx="0" cy="0"/>
+        </a:xfrm>
+      </p:grpSpPr>
+      <p:sp>
+        <p:nvSpPr>
+          <p:cNvPr id="2" name="Slide Image Placeholder 1"/>
+          <p:cNvSpPr>
+            <a:spLocks noGrp="1" noRot="1" noChangeAspect="1"/>
+          </p:cNvSpPr>
+          <p:nvPr>
+            <p:ph type="sldImg"/>
+          </p:nvPr>
+        </p:nvSpPr>
+        <p:spPr/>
+      </p:sp>
+      <p:sp>
+        <p:nvSpPr>
+          <p:cNvPr id="3" name="Notes Placeholder 2"/>
+          <p:cNvSpPr>
+            <a:spLocks noGrp="1"/>
+          </p:cNvSpPr>
+          <p:nvPr>
+            <p:ph type="body" idx="1"/>
+          </p:nvPr>
+        </p:nvSpPr>
+        <p:spPr/>
+        <p:txBody>
+          <a:bodyPr/>
+          <a:lstStyle/>
+          <a:p>
+            <a:endParaRPr lang="en-CA" dirty="0"/>
+          </a:p>
+        </p:txBody>
+      </p:sp>
+      <p:sp>
+        <p:nvSpPr>
+          <p:cNvPr id="4" name="Header Placeholder 3"/>
+          <p:cNvSpPr>
+            <a:spLocks noGrp="1"/>
+          </p:cNvSpPr>
+          <p:nvPr>
+            <p:ph type="hdr" sz="quarter" idx="10"/>
+          </p:nvPr>
+        </p:nvSpPr>
+        <p:spPr/>
+        <p:txBody>
+          <a:bodyPr/>
+          <a:lstStyle/>
+          <a:p>
+            <a:endParaRPr lang="en-US" dirty="0"/>
+          </a:p>
+        </p:txBody>
+      </p:sp>
+      <p:sp>
+        <p:nvSpPr>
+          <p:cNvPr id="5" name="Footer Placeholder 4"/>
+          <p:cNvSpPr>
+            <a:spLocks noGrp="1"/>
+          </p:cNvSpPr>
+          <p:nvPr>
+            <p:ph type="ftr" sz="quarter" idx="11"/>
+          </p:nvPr>
+        </p:nvSpPr>
+        <p:spPr/>
+        <p:txBody>
+          <a:bodyPr/>
+          <a:lstStyle/>
+          <a:p>
+            <a:pPr defTabSz="939012" eaLnBrk="0" hangingPunct="0"/>
+            <a:r>
+              <a:rPr lang="en-US" sz="400">
+                <a:gradFill>
+                  <a:gsLst>
+                    <a:gs pos="0">
+                      <a:prstClr val="black"/>
+                    </a:gs>
+                    <a:gs pos="100000">
+                      <a:prstClr val="black"/>
+                    </a:gs>
+                  </a:gsLst>
+                  <a:lin ang="5400000" scaled="0"/>
+                </a:gradFill>
+                <a:latin typeface="Segoe UI" pitchFamily="34" charset="0"/>
+                <a:ea typeface="Segoe UI" pitchFamily="34" charset="0"/>
+                <a:cs typeface="Segoe UI" pitchFamily="34" charset="0"/>
+              </a:rPr>
+              <a:t>© Microsoft Corporation. All rights reserved. MICROSOFT MAKES NO WARRANTIES, EXPRESS, IMPLIED OR STATUTORY, AS TO THE INFORMATION IN THIS PRESENTATION.</a:t>
+            </a:r>
+            <a:endParaRPr lang="en-US" sz="400" dirty="0">
+              <a:gradFill>
+                <a:gsLst>
+                  <a:gs pos="0">
+                    <a:prstClr val="black"/>
+                  </a:gs>
+                  <a:gs pos="100000">
+                    <a:prstClr val="black"/>
+                  </a:gs>
+                </a:gsLst>
+                <a:lin ang="5400000" scaled="0"/>
+              </a:gradFill>
+              <a:latin typeface="Segoe UI" pitchFamily="34" charset="0"/>
+              <a:ea typeface="Segoe UI" pitchFamily="34" charset="0"/>
+              <a:cs typeface="Segoe UI" pitchFamily="34" charset="0"/>
+            </a:endParaRPr>
+          </a:p>
+        </p:txBody>
+      </p:sp>
+      <p:sp>
+        <p:nvSpPr>
+          <p:cNvPr id="6" name="Date Placeholder 5"/>
+          <p:cNvSpPr>
+            <a:spLocks noGrp="1"/>
+          </p:cNvSpPr>
+          <p:nvPr>
+            <p:ph type="dt" idx="12"/>
+          </p:nvPr>
+        </p:nvSpPr>
+        <p:spPr/>
+        <p:txBody>
+          <a:bodyPr/>
+          <a:lstStyle/>
+          <a:p>
+            <a:fld id="{D18B56EA-E28F-4F92-9F16-7A6F2501B303}" type="datetime8">
+              <a:rPr lang="en-US" smtClean="0"/>
+              <a:t>6/28/2018 9:38 PM</a:t>
+            </a:fld>
+            <a:endParaRPr lang="en-US" dirty="0"/>
+          </a:p>
+        </p:txBody>
+      </p:sp>
+      <p:sp>
+        <p:nvSpPr>
+          <p:cNvPr id="7" name="Slide Number Placeholder 6"/>
+          <p:cNvSpPr>
+            <a:spLocks noGrp="1"/>
+          </p:cNvSpPr>
+          <p:nvPr>
+            <p:ph type="sldNum" sz="quarter" idx="13"/>
+          </p:nvPr>
+        </p:nvSpPr>
+        <p:spPr/>
+        <p:txBody>
+          <a:bodyPr/>
+          <a:lstStyle/>
+          <a:p>
+            <a:fld id="{B4008EB6-D09E-4580-8CD6-DDB14511944F}" type="slidenum">
+              <a:rPr lang="en-US" smtClean="0"/>
+              <a:pPr/>
+              <a:t>6</a:t>
+            </a:fld>
+            <a:endParaRPr lang="en-US" dirty="0"/>
+          </a:p>
+        </p:txBody>
+      </p:sp>
+    </p:spTree>
+    <p:extLst>
+      <p:ext uri="{BB962C8B-B14F-4D97-AF65-F5344CB8AC3E}">
+        <p14:creationId xmlns:p14="http://schemas.microsoft.com/office/powerpoint/2010/main" val="3120606299"/>
       </p:ext>
     </p:extLst>
   </p:cSld>
@@ -14483,6 +14666,245 @@
     <p:extLst>
       <p:ext uri="{BB962C8B-B14F-4D97-AF65-F5344CB8AC3E}">
         <p14:creationId xmlns:p14="http://schemas.microsoft.com/office/powerpoint/2010/main" val="1111248150"/>
+      </p:ext>
+    </p:extLst>
+  </p:cSld>
+  <p:clrMapOvr>
+    <a:masterClrMapping/>
+  </p:clrMapOvr>
+  <mc:AlternateContent xmlns:mc="http://schemas.openxmlformats.org/markup-compatibility/2006" xmlns:p14="http://schemas.microsoft.com/office/powerpoint/2010/main">
+    <mc:Choice Requires="p14">
+      <p:transition spd="med" p14:dur="700">
+        <p:fade/>
+      </p:transition>
+    </mc:Choice>
+    <mc:Fallback xmlns="">
+      <p:transition spd="med">
+        <p:fade/>
+      </p:transition>
+    </mc:Fallback>
+  </mc:AlternateContent>
+</p:sld>
+</file>
+
+<file path=ppt/slides/slide5.xml><?xml version="1.0" encoding="utf-8"?>
+<p:sld xmlns:a="http://schemas.openxmlformats.org/drawingml/2006/main" xmlns:r="http://schemas.openxmlformats.org/officeDocument/2006/relationships" xmlns:p="http://schemas.openxmlformats.org/presentationml/2006/main">
+  <p:cSld>
+    <p:spTree>
+      <p:nvGrpSpPr>
+        <p:cNvPr id="1" name=""/>
+        <p:cNvGrpSpPr/>
+        <p:nvPr/>
+      </p:nvGrpSpPr>
+      <p:grpSpPr>
+        <a:xfrm>
+          <a:off x="0" y="0"/>
+          <a:ext cx="0" cy="0"/>
+          <a:chOff x="0" y="0"/>
+          <a:chExt cx="0" cy="0"/>
+        </a:xfrm>
+      </p:grpSpPr>
+      <p:sp>
+        <p:nvSpPr>
+          <p:cNvPr id="2" name="Title 1">
+            <a:extLst>
+              <a:ext uri="{FF2B5EF4-FFF2-40B4-BE49-F238E27FC236}">
+                <a16:creationId xmlns:a16="http://schemas.microsoft.com/office/drawing/2014/main" id="{5083DC92-9718-4529-8452-4FD729734B5E}"/>
+              </a:ext>
+            </a:extLst>
+          </p:cNvPr>
+          <p:cNvSpPr>
+            <a:spLocks noGrp="1"/>
+          </p:cNvSpPr>
+          <p:nvPr>
+            <p:ph type="title"/>
+          </p:nvPr>
+        </p:nvSpPr>
+        <p:spPr/>
+        <p:txBody>
+          <a:bodyPr/>
+          <a:lstStyle/>
+          <a:p>
+            <a:endParaRPr lang="en-US"/>
+          </a:p>
+        </p:txBody>
+      </p:sp>
+      <p:pic>
+        <p:nvPicPr>
+          <p:cNvPr id="3" name="Picture 2">
+            <a:extLst>
+              <a:ext uri="{FF2B5EF4-FFF2-40B4-BE49-F238E27FC236}">
+                <a16:creationId xmlns:a16="http://schemas.microsoft.com/office/drawing/2014/main" id="{BB529859-382E-45AD-8D62-C2C7AA72E5C5}"/>
+              </a:ext>
+            </a:extLst>
+          </p:cNvPr>
+          <p:cNvPicPr>
+            <a:picLocks noChangeAspect="1"/>
+          </p:cNvPicPr>
+          <p:nvPr/>
+        </p:nvPicPr>
+        <p:blipFill>
+          <a:blip r:embed="rId2"/>
+          <a:stretch>
+            <a:fillRect/>
+          </a:stretch>
+        </p:blipFill>
+        <p:spPr>
+          <a:xfrm>
+            <a:off x="0" y="-1"/>
+            <a:ext cx="12541543" cy="6994525"/>
+          </a:xfrm>
+          <a:prstGeom prst="rect">
+            <a:avLst/>
+          </a:prstGeom>
+        </p:spPr>
+      </p:pic>
+    </p:spTree>
+    <p:extLst>
+      <p:ext uri="{BB962C8B-B14F-4D97-AF65-F5344CB8AC3E}">
+        <p14:creationId xmlns:p14="http://schemas.microsoft.com/office/powerpoint/2010/main" val="1402941502"/>
+      </p:ext>
+    </p:extLst>
+  </p:cSld>
+  <p:clrMapOvr>
+    <a:masterClrMapping/>
+  </p:clrMapOvr>
+  <mc:AlternateContent xmlns:mc="http://schemas.openxmlformats.org/markup-compatibility/2006" xmlns:p14="http://schemas.microsoft.com/office/powerpoint/2010/main">
+    <mc:Choice Requires="p14">
+      <p:transition spd="med" p14:dur="700">
+        <p:fade/>
+      </p:transition>
+    </mc:Choice>
+    <mc:Fallback xmlns="">
+      <p:transition spd="med">
+        <p:fade/>
+      </p:transition>
+    </mc:Fallback>
+  </mc:AlternateContent>
+</p:sld>
+</file>
+
+<file path=ppt/slides/slide6.xml><?xml version="1.0" encoding="utf-8"?>
+<p:sld xmlns:a="http://schemas.openxmlformats.org/drawingml/2006/main" xmlns:r="http://schemas.openxmlformats.org/officeDocument/2006/relationships" xmlns:p="http://schemas.openxmlformats.org/presentationml/2006/main">
+  <p:cSld>
+    <p:spTree>
+      <p:nvGrpSpPr>
+        <p:cNvPr id="1" name=""/>
+        <p:cNvGrpSpPr/>
+        <p:nvPr/>
+      </p:nvGrpSpPr>
+      <p:grpSpPr>
+        <a:xfrm>
+          <a:off x="0" y="0"/>
+          <a:ext cx="0" cy="0"/>
+          <a:chOff x="0" y="0"/>
+          <a:chExt cx="0" cy="0"/>
+        </a:xfrm>
+      </p:grpSpPr>
+      <p:sp>
+        <p:nvSpPr>
+          <p:cNvPr id="2" name="Title 1">
+            <a:extLst>
+              <a:ext uri="{FF2B5EF4-FFF2-40B4-BE49-F238E27FC236}">
+                <a16:creationId xmlns:a16="http://schemas.microsoft.com/office/drawing/2014/main" id="{15C5F5EB-D490-450E-8FDB-D2B3927DA121}"/>
+              </a:ext>
+            </a:extLst>
+          </p:cNvPr>
+          <p:cNvSpPr>
+            <a:spLocks noGrp="1"/>
+          </p:cNvSpPr>
+          <p:nvPr>
+            <p:ph type="title"/>
+          </p:nvPr>
+        </p:nvSpPr>
+        <p:spPr>
+          <a:xfrm>
+            <a:off x="8257006" y="832966"/>
+            <a:ext cx="3929742" cy="917575"/>
+          </a:xfrm>
+        </p:spPr>
+        <p:txBody>
+          <a:bodyPr/>
+          <a:lstStyle/>
+          <a:p>
+            <a:r>
+              <a:rPr lang="en-US" dirty="0"/>
+              <a:t>Learning from mistakes </a:t>
+            </a:r>
+            <a:r>
+              <a:rPr lang="en-US" dirty="0">
+                <a:sym typeface="Wingdings" panose="05000000000000000000" pitchFamily="2" charset="2"/>
+              </a:rPr>
+              <a:t></a:t>
+            </a:r>
+            <a:endParaRPr lang="en-CA" dirty="0"/>
+          </a:p>
+        </p:txBody>
+      </p:sp>
+      <p:pic>
+        <p:nvPicPr>
+          <p:cNvPr id="6" name="Picture 5" descr="A screenshot of a cell phone&#10;&#10;Description generated with very high confidence">
+            <a:extLst>
+              <a:ext uri="{FF2B5EF4-FFF2-40B4-BE49-F238E27FC236}">
+                <a16:creationId xmlns:a16="http://schemas.microsoft.com/office/drawing/2014/main" id="{5F07A35B-B31A-429F-A6DE-76A012DC8641}"/>
+              </a:ext>
+            </a:extLst>
+          </p:cNvPr>
+          <p:cNvPicPr>
+            <a:picLocks noChangeAspect="1"/>
+          </p:cNvPicPr>
+          <p:nvPr/>
+        </p:nvPicPr>
+        <p:blipFill>
+          <a:blip r:embed="rId3"/>
+          <a:stretch>
+            <a:fillRect/>
+          </a:stretch>
+        </p:blipFill>
+        <p:spPr>
+          <a:xfrm>
+            <a:off x="-30511" y="-1"/>
+            <a:ext cx="7904932" cy="7018483"/>
+          </a:xfrm>
+          <a:prstGeom prst="rect">
+            <a:avLst/>
+          </a:prstGeom>
+        </p:spPr>
+      </p:pic>
+      <p:pic>
+        <p:nvPicPr>
+          <p:cNvPr id="4" name="Picture 3" descr="A screenshot of a social media post&#10;&#10;Description generated with very high confidence">
+            <a:extLst>
+              <a:ext uri="{FF2B5EF4-FFF2-40B4-BE49-F238E27FC236}">
+                <a16:creationId xmlns:a16="http://schemas.microsoft.com/office/drawing/2014/main" id="{874D3660-5355-43E9-B88F-825ECB524D25}"/>
+              </a:ext>
+            </a:extLst>
+          </p:cNvPr>
+          <p:cNvPicPr>
+            <a:picLocks noChangeAspect="1"/>
+          </p:cNvPicPr>
+          <p:nvPr/>
+        </p:nvPicPr>
+        <p:blipFill>
+          <a:blip r:embed="rId4"/>
+          <a:stretch>
+            <a:fillRect/>
+          </a:stretch>
+        </p:blipFill>
+        <p:spPr>
+          <a:xfrm>
+            <a:off x="3697957" y="3209229"/>
+            <a:ext cx="8488791" cy="3490021"/>
+          </a:xfrm>
+          <a:prstGeom prst="rect">
+            <a:avLst/>
+          </a:prstGeom>
+        </p:spPr>
+      </p:pic>
+    </p:spTree>
+    <p:extLst>
+      <p:ext uri="{BB962C8B-B14F-4D97-AF65-F5344CB8AC3E}">
+        <p14:creationId xmlns:p14="http://schemas.microsoft.com/office/powerpoint/2010/main" val="587950767"/>
       </p:ext>
     </p:extLst>
   </p:cSld>

</xml_diff>

<commit_message>
DRAFT 1.1 of the progressive-expsoure-cost article. We can merge once we have updated all XXX placeholders.
</commit_message>
<xml_diff>
--- a/src/articles/progressive-exposure-cost.pptx
+++ b/src/articles/progressive-exposure-cost.pptx
@@ -237,7 +237,7 @@
               <a:rPr lang="en-US" smtClean="0">
                 <a:latin typeface="Segoe UI" pitchFamily="34" charset="0"/>
               </a:rPr>
-              <a:t>6/28/2018 9:38 PM</a:t>
+              <a:t>6/29/2018 3:01 PM</a:t>
             </a:fld>
             <a:endParaRPr lang="en-US" dirty="0">
               <a:latin typeface="Segoe UI" pitchFamily="34" charset="0"/>
@@ -415,7 +415,7 @@
           <a:p>
             <a:fld id="{D18B56EA-E28F-4F92-9F16-7A6F2501B303}" type="datetime8">
               <a:rPr lang="en-US" smtClean="0"/>
-              <a:t>6/28/2018 9:37 PM</a:t>
+              <a:t>6/29/2018 3:01 PM</a:t>
             </a:fld>
             <a:endParaRPr lang="en-US" dirty="0"/>
           </a:p>
@@ -798,7 +798,7 @@
           <a:p>
             <a:fld id="{D18B56EA-E28F-4F92-9F16-7A6F2501B303}" type="datetime8">
               <a:rPr lang="en-US" smtClean="0"/>
-              <a:t>6/28/2018 9:38 PM</a:t>
+              <a:t>6/29/2018 3:01 PM</a:t>
             </a:fld>
             <a:endParaRPr lang="en-US" dirty="0"/>
           </a:p>
@@ -979,7 +979,7 @@
           <a:p>
             <a:fld id="{D18B56EA-E28F-4F92-9F16-7A6F2501B303}" type="datetime8">
               <a:rPr lang="en-US" smtClean="0"/>
-              <a:t>6/28/2018 9:38 PM</a:t>
+              <a:t>6/29/2018 3:01 PM</a:t>
             </a:fld>
             <a:endParaRPr lang="en-US" dirty="0"/>
           </a:p>
@@ -8908,7 +8908,86 @@
             <a:avLst/>
           </a:prstGeom>
           <a:solidFill>
-            <a:srgbClr val="008000"/>
+            <a:schemeClr val="bg2">
+              <a:lumMod val="50000"/>
+            </a:schemeClr>
+          </a:solidFill>
+          <a:ln>
+            <a:solidFill>
+              <a:srgbClr val="7030A0"/>
+            </a:solidFill>
+            <a:headEnd type="none" w="med" len="med"/>
+            <a:tailEnd type="none" w="med" len="med"/>
+          </a:ln>
+          <a:effectLst/>
+        </p:spPr>
+        <p:style>
+          <a:lnRef idx="1">
+            <a:schemeClr val="accent2"/>
+          </a:lnRef>
+          <a:fillRef idx="3">
+            <a:schemeClr val="accent2"/>
+          </a:fillRef>
+          <a:effectRef idx="2">
+            <a:schemeClr val="accent2"/>
+          </a:effectRef>
+          <a:fontRef idx="minor">
+            <a:schemeClr val="lt1"/>
+          </a:fontRef>
+        </p:style>
+        <p:txBody>
+          <a:bodyPr rot="0" spcFirstLastPara="0" vertOverflow="overflow" horzOverflow="overflow" vert="horz" wrap="square" lIns="182880" tIns="146304" rIns="182880" bIns="146304" numCol="1" spcCol="0" rtlCol="0" fromWordArt="0" anchor="t" anchorCtr="0" forceAA="0" compatLnSpc="1">
+            <a:prstTxWarp prst="textNoShape">
+              <a:avLst/>
+            </a:prstTxWarp>
+            <a:noAutofit/>
+          </a:bodyPr>
+          <a:lstStyle/>
+          <a:p>
+            <a:pPr algn="ctr" defTabSz="932472" fontAlgn="base">
+              <a:lnSpc>
+                <a:spcPct val="90000"/>
+              </a:lnSpc>
+              <a:spcBef>
+                <a:spcPct val="0"/>
+              </a:spcBef>
+              <a:spcAft>
+                <a:spcPct val="0"/>
+              </a:spcAft>
+            </a:pPr>
+            <a:endParaRPr lang="en-US" sz="1400" dirty="0" err="1">
+              <a:solidFill>
+                <a:srgbClr val="002060"/>
+              </a:solidFill>
+              <a:cs typeface="Segoe UI" pitchFamily="34" charset="0"/>
+            </a:endParaRPr>
+          </a:p>
+        </p:txBody>
+      </p:sp>
+      <p:sp>
+        <p:nvSpPr>
+          <p:cNvPr id="42" name="Rectangle: Rounded Corners 41">
+            <a:extLst>
+              <a:ext uri="{FF2B5EF4-FFF2-40B4-BE49-F238E27FC236}">
+                <a16:creationId xmlns:a16="http://schemas.microsoft.com/office/drawing/2014/main" id="{51A3B5C4-4C57-49D2-999D-74603FB9BB25}"/>
+              </a:ext>
+            </a:extLst>
+          </p:cNvPr>
+          <p:cNvSpPr/>
+          <p:nvPr/>
+        </p:nvSpPr>
+        <p:spPr bwMode="auto">
+          <a:xfrm>
+            <a:off x="6434261" y="3461300"/>
+            <a:ext cx="2127424" cy="331559"/>
+          </a:xfrm>
+          <a:prstGeom prst="roundRect">
+            <a:avLst/>
+          </a:prstGeom>
+          <a:solidFill>
+            <a:schemeClr val="bg2">
+              <a:lumMod val="50000"/>
+            </a:schemeClr>
           </a:solidFill>
           <a:ln>
             <a:solidFill>
@@ -8963,12 +9042,206 @@
           </a:p>
         </p:txBody>
       </p:sp>
-      <p:sp>
-        <p:nvSpPr>
-          <p:cNvPr id="42" name="Rectangle: Rounded Corners 41">
-            <a:extLst>
-              <a:ext uri="{FF2B5EF4-FFF2-40B4-BE49-F238E27FC236}">
-                <a16:creationId xmlns:a16="http://schemas.microsoft.com/office/drawing/2014/main" id="{51A3B5C4-4C57-49D2-999D-74603FB9BB25}"/>
+      <p:cxnSp>
+        <p:nvCxnSpPr>
+          <p:cNvPr id="43" name="Straight Arrow Connector 42">
+            <a:extLst>
+              <a:ext uri="{FF2B5EF4-FFF2-40B4-BE49-F238E27FC236}">
+                <a16:creationId xmlns:a16="http://schemas.microsoft.com/office/drawing/2014/main" id="{6E7E93C7-C11B-44C8-A8D7-4C0926843C12}"/>
+              </a:ext>
+            </a:extLst>
+          </p:cNvPr>
+          <p:cNvCxnSpPr/>
+          <p:nvPr/>
+        </p:nvCxnSpPr>
+        <p:spPr>
+          <a:xfrm>
+            <a:off x="5838741" y="3244630"/>
+            <a:ext cx="504056" cy="0"/>
+          </a:xfrm>
+          <a:prstGeom prst="straightConnector1">
+            <a:avLst/>
+          </a:prstGeom>
+          <a:ln>
+            <a:solidFill>
+              <a:schemeClr val="tx1"/>
+            </a:solidFill>
+            <a:prstDash val="dash"/>
+            <a:headEnd type="none"/>
+            <a:tailEnd type="triangle" w="lg" len="sm"/>
+          </a:ln>
+        </p:spPr>
+        <p:style>
+          <a:lnRef idx="1">
+            <a:schemeClr val="accent1"/>
+          </a:lnRef>
+          <a:fillRef idx="0">
+            <a:schemeClr val="accent1"/>
+          </a:fillRef>
+          <a:effectRef idx="0">
+            <a:schemeClr val="accent1"/>
+          </a:effectRef>
+          <a:fontRef idx="minor">
+            <a:schemeClr val="tx1"/>
+          </a:fontRef>
+        </p:style>
+      </p:cxnSp>
+      <p:cxnSp>
+        <p:nvCxnSpPr>
+          <p:cNvPr id="44" name="Straight Arrow Connector 43">
+            <a:extLst>
+              <a:ext uri="{FF2B5EF4-FFF2-40B4-BE49-F238E27FC236}">
+                <a16:creationId xmlns:a16="http://schemas.microsoft.com/office/drawing/2014/main" id="{56E24C1E-B3C8-4F3E-9E0A-E40677FEA567}"/>
+              </a:ext>
+            </a:extLst>
+          </p:cNvPr>
+          <p:cNvCxnSpPr>
+            <a:cxnSpLocks/>
+          </p:cNvCxnSpPr>
+          <p:nvPr/>
+        </p:nvCxnSpPr>
+        <p:spPr>
+          <a:xfrm>
+            <a:off x="5826662" y="3627079"/>
+            <a:ext cx="516135" cy="0"/>
+          </a:xfrm>
+          <a:prstGeom prst="straightConnector1">
+            <a:avLst/>
+          </a:prstGeom>
+          <a:ln>
+            <a:solidFill>
+              <a:schemeClr val="tx1"/>
+            </a:solidFill>
+            <a:prstDash val="dash"/>
+            <a:headEnd type="none"/>
+            <a:tailEnd type="triangle" w="lg" len="sm"/>
+          </a:ln>
+        </p:spPr>
+        <p:style>
+          <a:lnRef idx="1">
+            <a:schemeClr val="accent1"/>
+          </a:lnRef>
+          <a:fillRef idx="0">
+            <a:schemeClr val="accent1"/>
+          </a:fillRef>
+          <a:effectRef idx="0">
+            <a:schemeClr val="accent1"/>
+          </a:effectRef>
+          <a:fontRef idx="minor">
+            <a:schemeClr val="tx1"/>
+          </a:fontRef>
+        </p:style>
+      </p:cxnSp>
+      <p:sp>
+        <p:nvSpPr>
+          <p:cNvPr id="45" name="TextBox 44">
+            <a:extLst>
+              <a:ext uri="{FF2B5EF4-FFF2-40B4-BE49-F238E27FC236}">
+                <a16:creationId xmlns:a16="http://schemas.microsoft.com/office/drawing/2014/main" id="{4BE1E951-BA68-449E-AD85-E90F144B4D85}"/>
+              </a:ext>
+            </a:extLst>
+          </p:cNvPr>
+          <p:cNvSpPr txBox="1"/>
+          <p:nvPr/>
+        </p:nvSpPr>
+        <p:spPr>
+          <a:xfrm>
+            <a:off x="6650285" y="2972248"/>
+            <a:ext cx="1688796" cy="544765"/>
+          </a:xfrm>
+          <a:prstGeom prst="rect">
+            <a:avLst/>
+          </a:prstGeom>
+          <a:noFill/>
+        </p:spPr>
+        <p:txBody>
+          <a:bodyPr wrap="none" lIns="182880" tIns="146304" rIns="182880" bIns="146304" rtlCol="0">
+            <a:spAutoFit/>
+          </a:bodyPr>
+          <a:lstStyle/>
+          <a:p>
+            <a:pPr>
+              <a:lnSpc>
+                <a:spcPct val="90000"/>
+              </a:lnSpc>
+              <a:spcAft>
+                <a:spcPts val="600"/>
+              </a:spcAft>
+            </a:pPr>
+            <a:r>
+              <a:rPr lang="en-CA" dirty="0">
+                <a:solidFill>
+                  <a:schemeClr val="bg1"/>
+                </a:solidFill>
+              </a:rPr>
+              <a:t>code path #3</a:t>
+            </a:r>
+            <a:endParaRPr lang="en-US" dirty="0" err="1">
+              <a:solidFill>
+                <a:schemeClr val="bg1"/>
+              </a:solidFill>
+            </a:endParaRPr>
+          </a:p>
+        </p:txBody>
+      </p:sp>
+      <p:sp>
+        <p:nvSpPr>
+          <p:cNvPr id="46" name="TextBox 45">
+            <a:extLst>
+              <a:ext uri="{FF2B5EF4-FFF2-40B4-BE49-F238E27FC236}">
+                <a16:creationId xmlns:a16="http://schemas.microsoft.com/office/drawing/2014/main" id="{3961FF2B-8C39-49F7-A7B7-D281F7DDC79B}"/>
+              </a:ext>
+            </a:extLst>
+          </p:cNvPr>
+          <p:cNvSpPr txBox="1"/>
+          <p:nvPr/>
+        </p:nvSpPr>
+        <p:spPr>
+          <a:xfrm>
+            <a:off x="6650285" y="3354697"/>
+            <a:ext cx="1688796" cy="544765"/>
+          </a:xfrm>
+          <a:prstGeom prst="rect">
+            <a:avLst/>
+          </a:prstGeom>
+          <a:noFill/>
+        </p:spPr>
+        <p:txBody>
+          <a:bodyPr wrap="none" lIns="182880" tIns="146304" rIns="182880" bIns="146304" rtlCol="0">
+            <a:spAutoFit/>
+          </a:bodyPr>
+          <a:lstStyle/>
+          <a:p>
+            <a:pPr>
+              <a:lnSpc>
+                <a:spcPct val="90000"/>
+              </a:lnSpc>
+              <a:spcAft>
+                <a:spcPts val="600"/>
+              </a:spcAft>
+            </a:pPr>
+            <a:r>
+              <a:rPr lang="en-CA" dirty="0">
+                <a:solidFill>
+                  <a:schemeClr val="bg1"/>
+                </a:solidFill>
+              </a:rPr>
+              <a:t>code path #4</a:t>
+            </a:r>
+            <a:endParaRPr lang="en-US" dirty="0" err="1">
+              <a:solidFill>
+                <a:schemeClr val="bg1"/>
+              </a:solidFill>
+            </a:endParaRPr>
+          </a:p>
+        </p:txBody>
+      </p:sp>
+      <p:sp>
+        <p:nvSpPr>
+          <p:cNvPr id="47" name="Rectangle: Rounded Corners 46">
+            <a:extLst>
+              <a:ext uri="{FF2B5EF4-FFF2-40B4-BE49-F238E27FC236}">
+                <a16:creationId xmlns:a16="http://schemas.microsoft.com/office/drawing/2014/main" id="{EBEB202D-C0DC-4E35-8DBF-15EA16103505}"/>
               </a:ext>
             </a:extLst>
           </p:cNvPr>
@@ -8977,7 +9250,84 @@
         </p:nvSpPr>
         <p:spPr bwMode="auto">
           <a:xfrm>
-            <a:off x="6434261" y="3461300"/>
+            <a:off x="9268405" y="3078851"/>
+            <a:ext cx="2127424" cy="331559"/>
+          </a:xfrm>
+          <a:prstGeom prst="roundRect">
+            <a:avLst/>
+          </a:prstGeom>
+          <a:solidFill>
+            <a:schemeClr val="bg2">
+              <a:lumMod val="50000"/>
+            </a:schemeClr>
+          </a:solidFill>
+          <a:ln>
+            <a:solidFill>
+              <a:srgbClr val="7030A0"/>
+            </a:solidFill>
+            <a:headEnd type="none" w="med" len="med"/>
+            <a:tailEnd type="none" w="med" len="med"/>
+          </a:ln>
+          <a:effectLst/>
+        </p:spPr>
+        <p:style>
+          <a:lnRef idx="1">
+            <a:schemeClr val="accent2"/>
+          </a:lnRef>
+          <a:fillRef idx="3">
+            <a:schemeClr val="accent2"/>
+          </a:fillRef>
+          <a:effectRef idx="2">
+            <a:schemeClr val="accent2"/>
+          </a:effectRef>
+          <a:fontRef idx="minor">
+            <a:schemeClr val="lt1"/>
+          </a:fontRef>
+        </p:style>
+        <p:txBody>
+          <a:bodyPr rot="0" spcFirstLastPara="0" vertOverflow="overflow" horzOverflow="overflow" vert="horz" wrap="square" lIns="182880" tIns="146304" rIns="182880" bIns="146304" numCol="1" spcCol="0" rtlCol="0" fromWordArt="0" anchor="t" anchorCtr="0" forceAA="0" compatLnSpc="1">
+            <a:prstTxWarp prst="textNoShape">
+              <a:avLst/>
+            </a:prstTxWarp>
+            <a:noAutofit/>
+          </a:bodyPr>
+          <a:lstStyle/>
+          <a:p>
+            <a:pPr algn="ctr" defTabSz="932472" fontAlgn="base">
+              <a:lnSpc>
+                <a:spcPct val="90000"/>
+              </a:lnSpc>
+              <a:spcBef>
+                <a:spcPct val="0"/>
+              </a:spcBef>
+              <a:spcAft>
+                <a:spcPct val="0"/>
+              </a:spcAft>
+            </a:pPr>
+            <a:endParaRPr lang="en-US" sz="1400" dirty="0" err="1">
+              <a:solidFill>
+                <a:srgbClr val="002060"/>
+              </a:solidFill>
+              <a:cs typeface="Segoe UI" pitchFamily="34" charset="0"/>
+            </a:endParaRPr>
+          </a:p>
+        </p:txBody>
+      </p:sp>
+      <p:sp>
+        <p:nvSpPr>
+          <p:cNvPr id="48" name="Rectangle: Rounded Corners 47">
+            <a:extLst>
+              <a:ext uri="{FF2B5EF4-FFF2-40B4-BE49-F238E27FC236}">
+                <a16:creationId xmlns:a16="http://schemas.microsoft.com/office/drawing/2014/main" id="{57B317A3-3AED-4851-89A5-E9CEE06817BC}"/>
+              </a:ext>
+            </a:extLst>
+          </p:cNvPr>
+          <p:cNvSpPr/>
+          <p:nvPr/>
+        </p:nvSpPr>
+        <p:spPr bwMode="auto">
+          <a:xfrm>
+            <a:off x="9274432" y="3461300"/>
             <a:ext cx="2127424" cy="331559"/>
           </a:xfrm>
           <a:prstGeom prst="roundRect">
@@ -9043,10 +9393,10 @@
       </p:sp>
       <p:cxnSp>
         <p:nvCxnSpPr>
-          <p:cNvPr id="43" name="Straight Arrow Connector 42">
-            <a:extLst>
-              <a:ext uri="{FF2B5EF4-FFF2-40B4-BE49-F238E27FC236}">
-                <a16:creationId xmlns:a16="http://schemas.microsoft.com/office/drawing/2014/main" id="{6E7E93C7-C11B-44C8-A8D7-4C0926843C12}"/>
+          <p:cNvPr id="49" name="Straight Arrow Connector 48">
+            <a:extLst>
+              <a:ext uri="{FF2B5EF4-FFF2-40B4-BE49-F238E27FC236}">
+                <a16:creationId xmlns:a16="http://schemas.microsoft.com/office/drawing/2014/main" id="{DAA7A904-B680-4473-9DA3-6EB9F6FB29A5}"/>
               </a:ext>
             </a:extLst>
           </p:cNvPr>
@@ -9055,7 +9405,7 @@
         </p:nvCxnSpPr>
         <p:spPr>
           <a:xfrm>
-            <a:off x="5838741" y="3244630"/>
+            <a:off x="8672885" y="3244630"/>
             <a:ext cx="504056" cy="0"/>
           </a:xfrm>
           <a:prstGeom prst="straightConnector1">
@@ -9085,24 +9435,126 @@
           </a:fontRef>
         </p:style>
       </p:cxnSp>
+      <p:sp>
+        <p:nvSpPr>
+          <p:cNvPr id="50" name="TextBox 49">
+            <a:extLst>
+              <a:ext uri="{FF2B5EF4-FFF2-40B4-BE49-F238E27FC236}">
+                <a16:creationId xmlns:a16="http://schemas.microsoft.com/office/drawing/2014/main" id="{6440FEEC-6E48-4242-98E8-55935F67D6C8}"/>
+              </a:ext>
+            </a:extLst>
+          </p:cNvPr>
+          <p:cNvSpPr txBox="1"/>
+          <p:nvPr/>
+        </p:nvSpPr>
+        <p:spPr>
+          <a:xfrm>
+            <a:off x="9484429" y="2972248"/>
+            <a:ext cx="1558760" cy="544765"/>
+          </a:xfrm>
+          <a:prstGeom prst="rect">
+            <a:avLst/>
+          </a:prstGeom>
+          <a:noFill/>
+        </p:spPr>
+        <p:txBody>
+          <a:bodyPr wrap="none" lIns="182880" tIns="146304" rIns="182880" bIns="146304" rtlCol="0">
+            <a:spAutoFit/>
+          </a:bodyPr>
+          <a:lstStyle/>
+          <a:p>
+            <a:pPr>
+              <a:lnSpc>
+                <a:spcPct val="90000"/>
+              </a:lnSpc>
+              <a:spcAft>
+                <a:spcPts val="600"/>
+              </a:spcAft>
+            </a:pPr>
+            <a:r>
+              <a:rPr lang="en-CA" dirty="0">
+                <a:solidFill>
+                  <a:schemeClr val="bg1"/>
+                </a:solidFill>
+              </a:rPr>
+              <a:t>test path #3</a:t>
+            </a:r>
+            <a:endParaRPr lang="en-US" dirty="0" err="1">
+              <a:solidFill>
+                <a:schemeClr val="bg1"/>
+              </a:solidFill>
+            </a:endParaRPr>
+          </a:p>
+        </p:txBody>
+      </p:sp>
+      <p:sp>
+        <p:nvSpPr>
+          <p:cNvPr id="51" name="TextBox 50">
+            <a:extLst>
+              <a:ext uri="{FF2B5EF4-FFF2-40B4-BE49-F238E27FC236}">
+                <a16:creationId xmlns:a16="http://schemas.microsoft.com/office/drawing/2014/main" id="{EDDE0860-C92F-4128-A7A5-30F4FFC6FB53}"/>
+              </a:ext>
+            </a:extLst>
+          </p:cNvPr>
+          <p:cNvSpPr txBox="1"/>
+          <p:nvPr/>
+        </p:nvSpPr>
+        <p:spPr>
+          <a:xfrm>
+            <a:off x="9484429" y="3342187"/>
+            <a:ext cx="1558760" cy="544765"/>
+          </a:xfrm>
+          <a:prstGeom prst="rect">
+            <a:avLst/>
+          </a:prstGeom>
+          <a:noFill/>
+        </p:spPr>
+        <p:txBody>
+          <a:bodyPr wrap="none" lIns="182880" tIns="146304" rIns="182880" bIns="146304" rtlCol="0">
+            <a:spAutoFit/>
+          </a:bodyPr>
+          <a:lstStyle/>
+          <a:p>
+            <a:pPr>
+              <a:lnSpc>
+                <a:spcPct val="90000"/>
+              </a:lnSpc>
+              <a:spcAft>
+                <a:spcPts val="600"/>
+              </a:spcAft>
+            </a:pPr>
+            <a:r>
+              <a:rPr lang="en-CA" dirty="0">
+                <a:solidFill>
+                  <a:schemeClr val="bg1"/>
+                </a:solidFill>
+              </a:rPr>
+              <a:t>test path #4</a:t>
+            </a:r>
+            <a:endParaRPr lang="en-US" dirty="0" err="1">
+              <a:solidFill>
+                <a:schemeClr val="bg1"/>
+              </a:solidFill>
+            </a:endParaRPr>
+          </a:p>
+        </p:txBody>
+      </p:sp>
       <p:cxnSp>
         <p:nvCxnSpPr>
-          <p:cNvPr id="44" name="Straight Arrow Connector 43">
-            <a:extLst>
-              <a:ext uri="{FF2B5EF4-FFF2-40B4-BE49-F238E27FC236}">
-                <a16:creationId xmlns:a16="http://schemas.microsoft.com/office/drawing/2014/main" id="{56E24C1E-B3C8-4F3E-9E0A-E40677FEA567}"/>
-              </a:ext>
-            </a:extLst>
-          </p:cNvPr>
-          <p:cNvCxnSpPr>
-            <a:cxnSpLocks/>
-          </p:cNvCxnSpPr>
+          <p:cNvPr id="52" name="Straight Arrow Connector 51">
+            <a:extLst>
+              <a:ext uri="{FF2B5EF4-FFF2-40B4-BE49-F238E27FC236}">
+                <a16:creationId xmlns:a16="http://schemas.microsoft.com/office/drawing/2014/main" id="{A9099D22-05DF-4D28-9D64-0DD768CED1BC}"/>
+              </a:ext>
+            </a:extLst>
+          </p:cNvPr>
+          <p:cNvCxnSpPr/>
           <p:nvPr/>
         </p:nvCxnSpPr>
         <p:spPr>
           <a:xfrm>
-            <a:off x="5826662" y="3627079"/>
-            <a:ext cx="516135" cy="0"/>
+            <a:off x="8656781" y="3627079"/>
+            <a:ext cx="504056" cy="0"/>
           </a:xfrm>
           <a:prstGeom prst="straightConnector1">
             <a:avLst/>
@@ -9133,10 +9585,10 @@
       </p:cxnSp>
       <p:sp>
         <p:nvSpPr>
-          <p:cNvPr id="45" name="TextBox 44">
-            <a:extLst>
-              <a:ext uri="{FF2B5EF4-FFF2-40B4-BE49-F238E27FC236}">
-                <a16:creationId xmlns:a16="http://schemas.microsoft.com/office/drawing/2014/main" id="{4BE1E951-BA68-449E-AD85-E90F144B4D85}"/>
+          <p:cNvPr id="53" name="TextBox 52">
+            <a:extLst>
+              <a:ext uri="{FF2B5EF4-FFF2-40B4-BE49-F238E27FC236}">
+                <a16:creationId xmlns:a16="http://schemas.microsoft.com/office/drawing/2014/main" id="{A4B086E6-3715-46DE-9E88-C6B3E6056557}"/>
               </a:ext>
             </a:extLst>
           </p:cNvPr>
@@ -9145,8 +9597,8 @@
         </p:nvSpPr>
         <p:spPr>
           <a:xfrm>
-            <a:off x="6650285" y="2972248"/>
-            <a:ext cx="1688796" cy="544765"/>
+            <a:off x="1158423" y="3391239"/>
+            <a:ext cx="455894" cy="544765"/>
           </a:xfrm>
           <a:prstGeom prst="rect">
             <a:avLst/>
@@ -9173,7 +9625,7 @@
                   <a:schemeClr val="bg1"/>
                 </a:solidFill>
               </a:rPr>
-              <a:t>code path #3</a:t>
+              <a:t>1</a:t>
             </a:r>
             <a:endParaRPr lang="en-US" dirty="0" err="1">
               <a:solidFill>
@@ -9185,62 +9637,10 @@
       </p:sp>
       <p:sp>
         <p:nvSpPr>
-          <p:cNvPr id="46" name="TextBox 45">
-            <a:extLst>
-              <a:ext uri="{FF2B5EF4-FFF2-40B4-BE49-F238E27FC236}">
-                <a16:creationId xmlns:a16="http://schemas.microsoft.com/office/drawing/2014/main" id="{3961FF2B-8C39-49F7-A7B7-D281F7DDC79B}"/>
-              </a:ext>
-            </a:extLst>
-          </p:cNvPr>
-          <p:cNvSpPr txBox="1"/>
-          <p:nvPr/>
-        </p:nvSpPr>
-        <p:spPr>
-          <a:xfrm>
-            <a:off x="6650285" y="3354697"/>
-            <a:ext cx="1688796" cy="544765"/>
-          </a:xfrm>
-          <a:prstGeom prst="rect">
-            <a:avLst/>
-          </a:prstGeom>
-          <a:noFill/>
-        </p:spPr>
-        <p:txBody>
-          <a:bodyPr wrap="none" lIns="182880" tIns="146304" rIns="182880" bIns="146304" rtlCol="0">
-            <a:spAutoFit/>
-          </a:bodyPr>
-          <a:lstStyle/>
-          <a:p>
-            <a:pPr>
-              <a:lnSpc>
-                <a:spcPct val="90000"/>
-              </a:lnSpc>
-              <a:spcAft>
-                <a:spcPts val="600"/>
-              </a:spcAft>
-            </a:pPr>
-            <a:r>
-              <a:rPr lang="en-CA" dirty="0">
-                <a:solidFill>
-                  <a:schemeClr val="bg1"/>
-                </a:solidFill>
-              </a:rPr>
-              <a:t>code path #4</a:t>
-            </a:r>
-            <a:endParaRPr lang="en-US" dirty="0" err="1">
-              <a:solidFill>
-                <a:schemeClr val="bg1"/>
-              </a:solidFill>
-            </a:endParaRPr>
-          </a:p>
-        </p:txBody>
-      </p:sp>
-      <p:sp>
-        <p:nvSpPr>
-          <p:cNvPr id="47" name="Rectangle: Rounded Corners 46">
-            <a:extLst>
-              <a:ext uri="{FF2B5EF4-FFF2-40B4-BE49-F238E27FC236}">
-                <a16:creationId xmlns:a16="http://schemas.microsoft.com/office/drawing/2014/main" id="{EBEB202D-C0DC-4E35-8DBF-15EA16103505}"/>
+          <p:cNvPr id="56" name="Rectangle: Rounded Corners 55">
+            <a:extLst>
+              <a:ext uri="{FF2B5EF4-FFF2-40B4-BE49-F238E27FC236}">
+                <a16:creationId xmlns:a16="http://schemas.microsoft.com/office/drawing/2014/main" id="{D469706A-A9F4-454E-A38E-4AF77229579A}"/>
               </a:ext>
             </a:extLst>
           </p:cNvPr>
@@ -9249,7 +9649,7 @@
         </p:nvSpPr>
         <p:spPr bwMode="auto">
           <a:xfrm>
-            <a:off x="9268405" y="3078851"/>
+            <a:off x="6434261" y="3843748"/>
             <a:ext cx="2127424" cy="331559"/>
           </a:xfrm>
           <a:prstGeom prst="roundRect">
@@ -9305,18 +9705,63 @@
               <a:solidFill>
                 <a:srgbClr val="002060"/>
               </a:solidFill>
-              <a:ea typeface="Segoe UI" pitchFamily="34" charset="0"/>
               <a:cs typeface="Segoe UI" pitchFamily="34" charset="0"/>
             </a:endParaRPr>
           </a:p>
         </p:txBody>
       </p:sp>
-      <p:sp>
-        <p:nvSpPr>
-          <p:cNvPr id="48" name="Rectangle: Rounded Corners 47">
-            <a:extLst>
-              <a:ext uri="{FF2B5EF4-FFF2-40B4-BE49-F238E27FC236}">
-                <a16:creationId xmlns:a16="http://schemas.microsoft.com/office/drawing/2014/main" id="{57B317A3-3AED-4851-89A5-E9CEE06817BC}"/>
+      <p:cxnSp>
+        <p:nvCxnSpPr>
+          <p:cNvPr id="57" name="Straight Arrow Connector 56">
+            <a:extLst>
+              <a:ext uri="{FF2B5EF4-FFF2-40B4-BE49-F238E27FC236}">
+                <a16:creationId xmlns:a16="http://schemas.microsoft.com/office/drawing/2014/main" id="{14953CA4-A583-43F6-8E77-A59D11B6E9F2}"/>
+              </a:ext>
+            </a:extLst>
+          </p:cNvPr>
+          <p:cNvCxnSpPr>
+            <a:cxnSpLocks/>
+          </p:cNvCxnSpPr>
+          <p:nvPr/>
+        </p:nvCxnSpPr>
+        <p:spPr>
+          <a:xfrm>
+            <a:off x="4274021" y="4009527"/>
+            <a:ext cx="2068776" cy="0"/>
+          </a:xfrm>
+          <a:prstGeom prst="straightConnector1">
+            <a:avLst/>
+          </a:prstGeom>
+          <a:ln>
+            <a:solidFill>
+              <a:schemeClr val="tx1"/>
+            </a:solidFill>
+            <a:prstDash val="dash"/>
+            <a:headEnd type="none"/>
+            <a:tailEnd type="triangle" w="lg" len="sm"/>
+          </a:ln>
+        </p:spPr>
+        <p:style>
+          <a:lnRef idx="1">
+            <a:schemeClr val="accent1"/>
+          </a:lnRef>
+          <a:fillRef idx="0">
+            <a:schemeClr val="accent1"/>
+          </a:fillRef>
+          <a:effectRef idx="0">
+            <a:schemeClr val="accent1"/>
+          </a:effectRef>
+          <a:fontRef idx="minor">
+            <a:schemeClr val="tx1"/>
+          </a:fontRef>
+        </p:style>
+      </p:cxnSp>
+      <p:sp>
+        <p:nvSpPr>
+          <p:cNvPr id="58" name="Rectangle: Rounded Corners 57">
+            <a:extLst>
+              <a:ext uri="{FF2B5EF4-FFF2-40B4-BE49-F238E27FC236}">
+                <a16:creationId xmlns:a16="http://schemas.microsoft.com/office/drawing/2014/main" id="{EB40A4BC-83D2-4085-9356-D147B5B5BBFA}"/>
               </a:ext>
             </a:extLst>
           </p:cNvPr>
@@ -9325,16 +9770,14 @@
         </p:nvSpPr>
         <p:spPr bwMode="auto">
           <a:xfrm>
-            <a:off x="9274432" y="3461300"/>
+            <a:off x="9274432" y="3843748"/>
             <a:ext cx="2127424" cy="331559"/>
           </a:xfrm>
           <a:prstGeom prst="roundRect">
             <a:avLst/>
           </a:prstGeom>
           <a:solidFill>
-            <a:schemeClr val="bg2">
-              <a:lumMod val="50000"/>
-            </a:schemeClr>
+            <a:srgbClr val="008000"/>
           </a:solidFill>
           <a:ln>
             <a:solidFill>
@@ -9383,7 +9826,6 @@
               <a:solidFill>
                 <a:srgbClr val="002060"/>
               </a:solidFill>
-              <a:ea typeface="Segoe UI" pitchFamily="34" charset="0"/>
               <a:cs typeface="Segoe UI" pitchFamily="34" charset="0"/>
             </a:endParaRPr>
           </a:p>
@@ -9391,10 +9833,10 @@
       </p:sp>
       <p:cxnSp>
         <p:nvCxnSpPr>
-          <p:cNvPr id="49" name="Straight Arrow Connector 48">
-            <a:extLst>
-              <a:ext uri="{FF2B5EF4-FFF2-40B4-BE49-F238E27FC236}">
-                <a16:creationId xmlns:a16="http://schemas.microsoft.com/office/drawing/2014/main" id="{DAA7A904-B680-4473-9DA3-6EB9F6FB29A5}"/>
+          <p:cNvPr id="59" name="Straight Arrow Connector 58">
+            <a:extLst>
+              <a:ext uri="{FF2B5EF4-FFF2-40B4-BE49-F238E27FC236}">
+                <a16:creationId xmlns:a16="http://schemas.microsoft.com/office/drawing/2014/main" id="{3C334998-8187-4529-97C1-46058948D3D9}"/>
               </a:ext>
             </a:extLst>
           </p:cNvPr>
@@ -9403,7 +9845,7 @@
         </p:nvCxnSpPr>
         <p:spPr>
           <a:xfrm>
-            <a:off x="8672885" y="3244630"/>
+            <a:off x="8656781" y="4009527"/>
             <a:ext cx="504056" cy="0"/>
           </a:xfrm>
           <a:prstGeom prst="straightConnector1">
@@ -9435,10 +9877,10 @@
       </p:cxnSp>
       <p:sp>
         <p:nvSpPr>
-          <p:cNvPr id="50" name="TextBox 49">
-            <a:extLst>
-              <a:ext uri="{FF2B5EF4-FFF2-40B4-BE49-F238E27FC236}">
-                <a16:creationId xmlns:a16="http://schemas.microsoft.com/office/drawing/2014/main" id="{6440FEEC-6E48-4242-98E8-55935F67D6C8}"/>
+          <p:cNvPr id="60" name="TextBox 59">
+            <a:extLst>
+              <a:ext uri="{FF2B5EF4-FFF2-40B4-BE49-F238E27FC236}">
+                <a16:creationId xmlns:a16="http://schemas.microsoft.com/office/drawing/2014/main" id="{0048F406-A7A6-40AA-98BB-C82F7D6FD2F7}"/>
               </a:ext>
             </a:extLst>
           </p:cNvPr>
@@ -9447,8 +9889,8 @@
         </p:nvSpPr>
         <p:spPr>
           <a:xfrm>
-            <a:off x="9484429" y="2972248"/>
-            <a:ext cx="1558760" cy="544765"/>
+            <a:off x="6657278" y="3723566"/>
+            <a:ext cx="1688796" cy="544765"/>
           </a:xfrm>
           <a:prstGeom prst="rect">
             <a:avLst/>
@@ -9475,7 +9917,7 @@
                   <a:schemeClr val="bg1"/>
                 </a:solidFill>
               </a:rPr>
-              <a:t>test path #3</a:t>
+              <a:t>code path #5</a:t>
             </a:r>
             <a:endParaRPr lang="en-US" dirty="0" err="1">
               <a:solidFill>
@@ -9487,10 +9929,10 @@
       </p:sp>
       <p:sp>
         <p:nvSpPr>
-          <p:cNvPr id="51" name="TextBox 50">
-            <a:extLst>
-              <a:ext uri="{FF2B5EF4-FFF2-40B4-BE49-F238E27FC236}">
-                <a16:creationId xmlns:a16="http://schemas.microsoft.com/office/drawing/2014/main" id="{EDDE0860-C92F-4128-A7A5-30F4FFC6FB53}"/>
+          <p:cNvPr id="61" name="TextBox 60">
+            <a:extLst>
+              <a:ext uri="{FF2B5EF4-FFF2-40B4-BE49-F238E27FC236}">
+                <a16:creationId xmlns:a16="http://schemas.microsoft.com/office/drawing/2014/main" id="{1B88C699-DA3D-4155-8C73-F3480AB10AF8}"/>
               </a:ext>
             </a:extLst>
           </p:cNvPr>
@@ -9499,453 +9941,7 @@
         </p:nvSpPr>
         <p:spPr>
           <a:xfrm>
-            <a:off x="9484429" y="3342187"/>
-            <a:ext cx="1558760" cy="544765"/>
-          </a:xfrm>
-          <a:prstGeom prst="rect">
-            <a:avLst/>
-          </a:prstGeom>
-          <a:noFill/>
-        </p:spPr>
-        <p:txBody>
-          <a:bodyPr wrap="none" lIns="182880" tIns="146304" rIns="182880" bIns="146304" rtlCol="0">
-            <a:spAutoFit/>
-          </a:bodyPr>
-          <a:lstStyle/>
-          <a:p>
-            <a:pPr>
-              <a:lnSpc>
-                <a:spcPct val="90000"/>
-              </a:lnSpc>
-              <a:spcAft>
-                <a:spcPts val="600"/>
-              </a:spcAft>
-            </a:pPr>
-            <a:r>
-              <a:rPr lang="en-CA" dirty="0">
-                <a:solidFill>
-                  <a:schemeClr val="bg1"/>
-                </a:solidFill>
-              </a:rPr>
-              <a:t>test path #4</a:t>
-            </a:r>
-            <a:endParaRPr lang="en-US" dirty="0" err="1">
-              <a:solidFill>
-                <a:schemeClr val="bg1"/>
-              </a:solidFill>
-            </a:endParaRPr>
-          </a:p>
-        </p:txBody>
-      </p:sp>
-      <p:cxnSp>
-        <p:nvCxnSpPr>
-          <p:cNvPr id="52" name="Straight Arrow Connector 51">
-            <a:extLst>
-              <a:ext uri="{FF2B5EF4-FFF2-40B4-BE49-F238E27FC236}">
-                <a16:creationId xmlns:a16="http://schemas.microsoft.com/office/drawing/2014/main" id="{A9099D22-05DF-4D28-9D64-0DD768CED1BC}"/>
-              </a:ext>
-            </a:extLst>
-          </p:cNvPr>
-          <p:cNvCxnSpPr/>
-          <p:nvPr/>
-        </p:nvCxnSpPr>
-        <p:spPr>
-          <a:xfrm>
-            <a:off x="8656781" y="3627079"/>
-            <a:ext cx="504056" cy="0"/>
-          </a:xfrm>
-          <a:prstGeom prst="straightConnector1">
-            <a:avLst/>
-          </a:prstGeom>
-          <a:ln>
-            <a:solidFill>
-              <a:schemeClr val="tx1"/>
-            </a:solidFill>
-            <a:prstDash val="dash"/>
-            <a:headEnd type="none"/>
-            <a:tailEnd type="triangle" w="lg" len="sm"/>
-          </a:ln>
-        </p:spPr>
-        <p:style>
-          <a:lnRef idx="1">
-            <a:schemeClr val="accent1"/>
-          </a:lnRef>
-          <a:fillRef idx="0">
-            <a:schemeClr val="accent1"/>
-          </a:fillRef>
-          <a:effectRef idx="0">
-            <a:schemeClr val="accent1"/>
-          </a:effectRef>
-          <a:fontRef idx="minor">
-            <a:schemeClr val="tx1"/>
-          </a:fontRef>
-        </p:style>
-      </p:cxnSp>
-      <p:sp>
-        <p:nvSpPr>
-          <p:cNvPr id="53" name="TextBox 52">
-            <a:extLst>
-              <a:ext uri="{FF2B5EF4-FFF2-40B4-BE49-F238E27FC236}">
-                <a16:creationId xmlns:a16="http://schemas.microsoft.com/office/drawing/2014/main" id="{A4B086E6-3715-46DE-9E88-C6B3E6056557}"/>
-              </a:ext>
-            </a:extLst>
-          </p:cNvPr>
-          <p:cNvSpPr txBox="1"/>
-          <p:nvPr/>
-        </p:nvSpPr>
-        <p:spPr>
-          <a:xfrm>
-            <a:off x="1158423" y="3391239"/>
-            <a:ext cx="455894" cy="544765"/>
-          </a:xfrm>
-          <a:prstGeom prst="rect">
-            <a:avLst/>
-          </a:prstGeom>
-          <a:noFill/>
-        </p:spPr>
-        <p:txBody>
-          <a:bodyPr wrap="none" lIns="182880" tIns="146304" rIns="182880" bIns="146304" rtlCol="0">
-            <a:spAutoFit/>
-          </a:bodyPr>
-          <a:lstStyle/>
-          <a:p>
-            <a:pPr>
-              <a:lnSpc>
-                <a:spcPct val="90000"/>
-              </a:lnSpc>
-              <a:spcAft>
-                <a:spcPts val="600"/>
-              </a:spcAft>
-            </a:pPr>
-            <a:r>
-              <a:rPr lang="en-CA" dirty="0">
-                <a:solidFill>
-                  <a:schemeClr val="bg1"/>
-                </a:solidFill>
-              </a:rPr>
-              <a:t>1</a:t>
-            </a:r>
-            <a:endParaRPr lang="en-US" dirty="0" err="1">
-              <a:solidFill>
-                <a:schemeClr val="bg1"/>
-              </a:solidFill>
-            </a:endParaRPr>
-          </a:p>
-        </p:txBody>
-      </p:sp>
-      <p:sp>
-        <p:nvSpPr>
-          <p:cNvPr id="56" name="Rectangle: Rounded Corners 55">
-            <a:extLst>
-              <a:ext uri="{FF2B5EF4-FFF2-40B4-BE49-F238E27FC236}">
-                <a16:creationId xmlns:a16="http://schemas.microsoft.com/office/drawing/2014/main" id="{D469706A-A9F4-454E-A38E-4AF77229579A}"/>
-              </a:ext>
-            </a:extLst>
-          </p:cNvPr>
-          <p:cNvSpPr/>
-          <p:nvPr/>
-        </p:nvSpPr>
-        <p:spPr bwMode="auto">
-          <a:xfrm>
-            <a:off x="6434261" y="3843748"/>
-            <a:ext cx="2127424" cy="331559"/>
-          </a:xfrm>
-          <a:prstGeom prst="roundRect">
-            <a:avLst/>
-          </a:prstGeom>
-          <a:solidFill>
-            <a:schemeClr val="bg2">
-              <a:lumMod val="50000"/>
-            </a:schemeClr>
-          </a:solidFill>
-          <a:ln>
-            <a:solidFill>
-              <a:srgbClr val="7030A0"/>
-            </a:solidFill>
-            <a:headEnd type="none" w="med" len="med"/>
-            <a:tailEnd type="none" w="med" len="med"/>
-          </a:ln>
-          <a:effectLst/>
-        </p:spPr>
-        <p:style>
-          <a:lnRef idx="1">
-            <a:schemeClr val="accent2"/>
-          </a:lnRef>
-          <a:fillRef idx="3">
-            <a:schemeClr val="accent2"/>
-          </a:fillRef>
-          <a:effectRef idx="2">
-            <a:schemeClr val="accent2"/>
-          </a:effectRef>
-          <a:fontRef idx="minor">
-            <a:schemeClr val="lt1"/>
-          </a:fontRef>
-        </p:style>
-        <p:txBody>
-          <a:bodyPr rot="0" spcFirstLastPara="0" vertOverflow="overflow" horzOverflow="overflow" vert="horz" wrap="square" lIns="182880" tIns="146304" rIns="182880" bIns="146304" numCol="1" spcCol="0" rtlCol="0" fromWordArt="0" anchor="t" anchorCtr="0" forceAA="0" compatLnSpc="1">
-            <a:prstTxWarp prst="textNoShape">
-              <a:avLst/>
-            </a:prstTxWarp>
-            <a:noAutofit/>
-          </a:bodyPr>
-          <a:lstStyle/>
-          <a:p>
-            <a:pPr algn="ctr" defTabSz="932472" fontAlgn="base">
-              <a:lnSpc>
-                <a:spcPct val="90000"/>
-              </a:lnSpc>
-              <a:spcBef>
-                <a:spcPct val="0"/>
-              </a:spcBef>
-              <a:spcAft>
-                <a:spcPct val="0"/>
-              </a:spcAft>
-            </a:pPr>
-            <a:endParaRPr lang="en-US" sz="1400" dirty="0" err="1">
-              <a:solidFill>
-                <a:srgbClr val="002060"/>
-              </a:solidFill>
-              <a:ea typeface="Segoe UI" pitchFamily="34" charset="0"/>
-              <a:cs typeface="Segoe UI" pitchFamily="34" charset="0"/>
-            </a:endParaRPr>
-          </a:p>
-        </p:txBody>
-      </p:sp>
-      <p:cxnSp>
-        <p:nvCxnSpPr>
-          <p:cNvPr id="57" name="Straight Arrow Connector 56">
-            <a:extLst>
-              <a:ext uri="{FF2B5EF4-FFF2-40B4-BE49-F238E27FC236}">
-                <a16:creationId xmlns:a16="http://schemas.microsoft.com/office/drawing/2014/main" id="{14953CA4-A583-43F6-8E77-A59D11B6E9F2}"/>
-              </a:ext>
-            </a:extLst>
-          </p:cNvPr>
-          <p:cNvCxnSpPr>
-            <a:cxnSpLocks/>
-          </p:cNvCxnSpPr>
-          <p:nvPr/>
-        </p:nvCxnSpPr>
-        <p:spPr>
-          <a:xfrm>
-            <a:off x="4274021" y="4009527"/>
-            <a:ext cx="2068776" cy="0"/>
-          </a:xfrm>
-          <a:prstGeom prst="straightConnector1">
-            <a:avLst/>
-          </a:prstGeom>
-          <a:ln>
-            <a:solidFill>
-              <a:schemeClr val="tx1"/>
-            </a:solidFill>
-            <a:prstDash val="dash"/>
-            <a:headEnd type="none"/>
-            <a:tailEnd type="triangle" w="lg" len="sm"/>
-          </a:ln>
-        </p:spPr>
-        <p:style>
-          <a:lnRef idx="1">
-            <a:schemeClr val="accent1"/>
-          </a:lnRef>
-          <a:fillRef idx="0">
-            <a:schemeClr val="accent1"/>
-          </a:fillRef>
-          <a:effectRef idx="0">
-            <a:schemeClr val="accent1"/>
-          </a:effectRef>
-          <a:fontRef idx="minor">
-            <a:schemeClr val="tx1"/>
-          </a:fontRef>
-        </p:style>
-      </p:cxnSp>
-      <p:sp>
-        <p:nvSpPr>
-          <p:cNvPr id="58" name="Rectangle: Rounded Corners 57">
-            <a:extLst>
-              <a:ext uri="{FF2B5EF4-FFF2-40B4-BE49-F238E27FC236}">
-                <a16:creationId xmlns:a16="http://schemas.microsoft.com/office/drawing/2014/main" id="{EB40A4BC-83D2-4085-9356-D147B5B5BBFA}"/>
-              </a:ext>
-            </a:extLst>
-          </p:cNvPr>
-          <p:cNvSpPr/>
-          <p:nvPr/>
-        </p:nvSpPr>
-        <p:spPr bwMode="auto">
-          <a:xfrm>
-            <a:off x="9274432" y="3843748"/>
-            <a:ext cx="2127424" cy="331559"/>
-          </a:xfrm>
-          <a:prstGeom prst="roundRect">
-            <a:avLst/>
-          </a:prstGeom>
-          <a:solidFill>
-            <a:schemeClr val="bg2">
-              <a:lumMod val="50000"/>
-            </a:schemeClr>
-          </a:solidFill>
-          <a:ln>
-            <a:solidFill>
-              <a:srgbClr val="7030A0"/>
-            </a:solidFill>
-            <a:headEnd type="none" w="med" len="med"/>
-            <a:tailEnd type="none" w="med" len="med"/>
-          </a:ln>
-          <a:effectLst/>
-        </p:spPr>
-        <p:style>
-          <a:lnRef idx="1">
-            <a:schemeClr val="accent2"/>
-          </a:lnRef>
-          <a:fillRef idx="3">
-            <a:schemeClr val="accent2"/>
-          </a:fillRef>
-          <a:effectRef idx="2">
-            <a:schemeClr val="accent2"/>
-          </a:effectRef>
-          <a:fontRef idx="minor">
-            <a:schemeClr val="lt1"/>
-          </a:fontRef>
-        </p:style>
-        <p:txBody>
-          <a:bodyPr rot="0" spcFirstLastPara="0" vertOverflow="overflow" horzOverflow="overflow" vert="horz" wrap="square" lIns="182880" tIns="146304" rIns="182880" bIns="146304" numCol="1" spcCol="0" rtlCol="0" fromWordArt="0" anchor="t" anchorCtr="0" forceAA="0" compatLnSpc="1">
-            <a:prstTxWarp prst="textNoShape">
-              <a:avLst/>
-            </a:prstTxWarp>
-            <a:noAutofit/>
-          </a:bodyPr>
-          <a:lstStyle/>
-          <a:p>
-            <a:pPr algn="ctr" defTabSz="932472" fontAlgn="base">
-              <a:lnSpc>
-                <a:spcPct val="90000"/>
-              </a:lnSpc>
-              <a:spcBef>
-                <a:spcPct val="0"/>
-              </a:spcBef>
-              <a:spcAft>
-                <a:spcPct val="0"/>
-              </a:spcAft>
-            </a:pPr>
-            <a:endParaRPr lang="en-US" sz="1400" dirty="0" err="1">
-              <a:solidFill>
-                <a:srgbClr val="002060"/>
-              </a:solidFill>
-              <a:ea typeface="Segoe UI" pitchFamily="34" charset="0"/>
-              <a:cs typeface="Segoe UI" pitchFamily="34" charset="0"/>
-            </a:endParaRPr>
-          </a:p>
-        </p:txBody>
-      </p:sp>
-      <p:cxnSp>
-        <p:nvCxnSpPr>
-          <p:cNvPr id="59" name="Straight Arrow Connector 58">
-            <a:extLst>
-              <a:ext uri="{FF2B5EF4-FFF2-40B4-BE49-F238E27FC236}">
-                <a16:creationId xmlns:a16="http://schemas.microsoft.com/office/drawing/2014/main" id="{3C334998-8187-4529-97C1-46058948D3D9}"/>
-              </a:ext>
-            </a:extLst>
-          </p:cNvPr>
-          <p:cNvCxnSpPr/>
-          <p:nvPr/>
-        </p:nvCxnSpPr>
-        <p:spPr>
-          <a:xfrm>
-            <a:off x="8656781" y="4009527"/>
-            <a:ext cx="504056" cy="0"/>
-          </a:xfrm>
-          <a:prstGeom prst="straightConnector1">
-            <a:avLst/>
-          </a:prstGeom>
-          <a:ln>
-            <a:solidFill>
-              <a:schemeClr val="tx1"/>
-            </a:solidFill>
-            <a:prstDash val="dash"/>
-            <a:headEnd type="none"/>
-            <a:tailEnd type="triangle" w="lg" len="sm"/>
-          </a:ln>
-        </p:spPr>
-        <p:style>
-          <a:lnRef idx="1">
-            <a:schemeClr val="accent1"/>
-          </a:lnRef>
-          <a:fillRef idx="0">
-            <a:schemeClr val="accent1"/>
-          </a:fillRef>
-          <a:effectRef idx="0">
-            <a:schemeClr val="accent1"/>
-          </a:effectRef>
-          <a:fontRef idx="minor">
-            <a:schemeClr val="tx1"/>
-          </a:fontRef>
-        </p:style>
-      </p:cxnSp>
-      <p:sp>
-        <p:nvSpPr>
-          <p:cNvPr id="60" name="TextBox 59">
-            <a:extLst>
-              <a:ext uri="{FF2B5EF4-FFF2-40B4-BE49-F238E27FC236}">
-                <a16:creationId xmlns:a16="http://schemas.microsoft.com/office/drawing/2014/main" id="{0048F406-A7A6-40AA-98BB-C82F7D6FD2F7}"/>
-              </a:ext>
-            </a:extLst>
-          </p:cNvPr>
-          <p:cNvSpPr txBox="1"/>
-          <p:nvPr/>
-        </p:nvSpPr>
-        <p:spPr>
-          <a:xfrm>
-            <a:off x="6657278" y="3723566"/>
-            <a:ext cx="1688796" cy="544765"/>
-          </a:xfrm>
-          <a:prstGeom prst="rect">
-            <a:avLst/>
-          </a:prstGeom>
-          <a:noFill/>
-        </p:spPr>
-        <p:txBody>
-          <a:bodyPr wrap="none" lIns="182880" tIns="146304" rIns="182880" bIns="146304" rtlCol="0">
-            <a:spAutoFit/>
-          </a:bodyPr>
-          <a:lstStyle/>
-          <a:p>
-            <a:pPr>
-              <a:lnSpc>
-                <a:spcPct val="90000"/>
-              </a:lnSpc>
-              <a:spcAft>
-                <a:spcPts val="600"/>
-              </a:spcAft>
-            </a:pPr>
-            <a:r>
-              <a:rPr lang="en-CA" dirty="0">
-                <a:solidFill>
-                  <a:schemeClr val="bg1"/>
-                </a:solidFill>
-              </a:rPr>
-              <a:t>code path #5</a:t>
-            </a:r>
-            <a:endParaRPr lang="en-US" dirty="0" err="1">
-              <a:solidFill>
-                <a:schemeClr val="bg1"/>
-              </a:solidFill>
-            </a:endParaRPr>
-          </a:p>
-        </p:txBody>
-      </p:sp>
-      <p:sp>
-        <p:nvSpPr>
-          <p:cNvPr id="61" name="TextBox 60">
-            <a:extLst>
-              <a:ext uri="{FF2B5EF4-FFF2-40B4-BE49-F238E27FC236}">
-                <a16:creationId xmlns:a16="http://schemas.microsoft.com/office/drawing/2014/main" id="{1B88C699-DA3D-4155-8C73-F3480AB10AF8}"/>
-              </a:ext>
-            </a:extLst>
-          </p:cNvPr>
-          <p:cNvSpPr txBox="1"/>
-          <p:nvPr/>
-        </p:nvSpPr>
-        <p:spPr>
-          <a:xfrm>
-            <a:off x="9491422" y="3711056"/>
+            <a:off x="9491422" y="3731672"/>
             <a:ext cx="1558760" cy="544765"/>
           </a:xfrm>
           <a:prstGeom prst="rect">
@@ -12103,7 +12099,86 @@
             <a:avLst/>
           </a:prstGeom>
           <a:solidFill>
-            <a:srgbClr val="008000"/>
+            <a:schemeClr val="bg2">
+              <a:lumMod val="50000"/>
+            </a:schemeClr>
+          </a:solidFill>
+          <a:ln>
+            <a:solidFill>
+              <a:srgbClr val="7030A0"/>
+            </a:solidFill>
+            <a:headEnd type="none" w="med" len="med"/>
+            <a:tailEnd type="none" w="med" len="med"/>
+          </a:ln>
+          <a:effectLst/>
+        </p:spPr>
+        <p:style>
+          <a:lnRef idx="1">
+            <a:schemeClr val="accent2"/>
+          </a:lnRef>
+          <a:fillRef idx="3">
+            <a:schemeClr val="accent2"/>
+          </a:fillRef>
+          <a:effectRef idx="2">
+            <a:schemeClr val="accent2"/>
+          </a:effectRef>
+          <a:fontRef idx="minor">
+            <a:schemeClr val="lt1"/>
+          </a:fontRef>
+        </p:style>
+        <p:txBody>
+          <a:bodyPr rot="0" spcFirstLastPara="0" vertOverflow="overflow" horzOverflow="overflow" vert="horz" wrap="square" lIns="182880" tIns="146304" rIns="182880" bIns="146304" numCol="1" spcCol="0" rtlCol="0" fromWordArt="0" anchor="t" anchorCtr="0" forceAA="0" compatLnSpc="1">
+            <a:prstTxWarp prst="textNoShape">
+              <a:avLst/>
+            </a:prstTxWarp>
+            <a:noAutofit/>
+          </a:bodyPr>
+          <a:lstStyle/>
+          <a:p>
+            <a:pPr algn="ctr" defTabSz="932472" fontAlgn="base">
+              <a:lnSpc>
+                <a:spcPct val="90000"/>
+              </a:lnSpc>
+              <a:spcBef>
+                <a:spcPct val="0"/>
+              </a:spcBef>
+              <a:spcAft>
+                <a:spcPct val="0"/>
+              </a:spcAft>
+            </a:pPr>
+            <a:endParaRPr lang="en-US" sz="1400" dirty="0" err="1">
+              <a:solidFill>
+                <a:srgbClr val="002060"/>
+              </a:solidFill>
+              <a:cs typeface="Segoe UI" pitchFamily="34" charset="0"/>
+            </a:endParaRPr>
+          </a:p>
+        </p:txBody>
+      </p:sp>
+      <p:sp>
+        <p:nvSpPr>
+          <p:cNvPr id="42" name="Rectangle: Rounded Corners 41">
+            <a:extLst>
+              <a:ext uri="{FF2B5EF4-FFF2-40B4-BE49-F238E27FC236}">
+                <a16:creationId xmlns:a16="http://schemas.microsoft.com/office/drawing/2014/main" id="{51A3B5C4-4C57-49D2-999D-74603FB9BB25}"/>
+              </a:ext>
+            </a:extLst>
+          </p:cNvPr>
+          <p:cNvSpPr/>
+          <p:nvPr/>
+        </p:nvSpPr>
+        <p:spPr bwMode="auto">
+          <a:xfrm>
+            <a:off x="6434261" y="3461300"/>
+            <a:ext cx="2127424" cy="331559"/>
+          </a:xfrm>
+          <a:prstGeom prst="roundRect">
+            <a:avLst/>
+          </a:prstGeom>
+          <a:solidFill>
+            <a:schemeClr val="bg2">
+              <a:lumMod val="50000"/>
+            </a:schemeClr>
           </a:solidFill>
           <a:ln>
             <a:solidFill>
@@ -12158,12 +12233,206 @@
           </a:p>
         </p:txBody>
       </p:sp>
-      <p:sp>
-        <p:nvSpPr>
-          <p:cNvPr id="42" name="Rectangle: Rounded Corners 41">
-            <a:extLst>
-              <a:ext uri="{FF2B5EF4-FFF2-40B4-BE49-F238E27FC236}">
-                <a16:creationId xmlns:a16="http://schemas.microsoft.com/office/drawing/2014/main" id="{51A3B5C4-4C57-49D2-999D-74603FB9BB25}"/>
+      <p:cxnSp>
+        <p:nvCxnSpPr>
+          <p:cNvPr id="43" name="Straight Arrow Connector 42">
+            <a:extLst>
+              <a:ext uri="{FF2B5EF4-FFF2-40B4-BE49-F238E27FC236}">
+                <a16:creationId xmlns:a16="http://schemas.microsoft.com/office/drawing/2014/main" id="{6E7E93C7-C11B-44C8-A8D7-4C0926843C12}"/>
+              </a:ext>
+            </a:extLst>
+          </p:cNvPr>
+          <p:cNvCxnSpPr/>
+          <p:nvPr/>
+        </p:nvCxnSpPr>
+        <p:spPr>
+          <a:xfrm>
+            <a:off x="5838741" y="3244630"/>
+            <a:ext cx="504056" cy="0"/>
+          </a:xfrm>
+          <a:prstGeom prst="straightConnector1">
+            <a:avLst/>
+          </a:prstGeom>
+          <a:ln>
+            <a:solidFill>
+              <a:schemeClr val="tx1"/>
+            </a:solidFill>
+            <a:prstDash val="dash"/>
+            <a:headEnd type="none"/>
+            <a:tailEnd type="triangle" w="lg" len="sm"/>
+          </a:ln>
+        </p:spPr>
+        <p:style>
+          <a:lnRef idx="1">
+            <a:schemeClr val="accent1"/>
+          </a:lnRef>
+          <a:fillRef idx="0">
+            <a:schemeClr val="accent1"/>
+          </a:fillRef>
+          <a:effectRef idx="0">
+            <a:schemeClr val="accent1"/>
+          </a:effectRef>
+          <a:fontRef idx="minor">
+            <a:schemeClr val="tx1"/>
+          </a:fontRef>
+        </p:style>
+      </p:cxnSp>
+      <p:cxnSp>
+        <p:nvCxnSpPr>
+          <p:cNvPr id="44" name="Straight Arrow Connector 43">
+            <a:extLst>
+              <a:ext uri="{FF2B5EF4-FFF2-40B4-BE49-F238E27FC236}">
+                <a16:creationId xmlns:a16="http://schemas.microsoft.com/office/drawing/2014/main" id="{56E24C1E-B3C8-4F3E-9E0A-E40677FEA567}"/>
+              </a:ext>
+            </a:extLst>
+          </p:cNvPr>
+          <p:cNvCxnSpPr>
+            <a:cxnSpLocks/>
+          </p:cNvCxnSpPr>
+          <p:nvPr/>
+        </p:nvCxnSpPr>
+        <p:spPr>
+          <a:xfrm>
+            <a:off x="5826662" y="3627079"/>
+            <a:ext cx="516135" cy="0"/>
+          </a:xfrm>
+          <a:prstGeom prst="straightConnector1">
+            <a:avLst/>
+          </a:prstGeom>
+          <a:ln>
+            <a:solidFill>
+              <a:schemeClr val="tx1"/>
+            </a:solidFill>
+            <a:prstDash val="dash"/>
+            <a:headEnd type="none"/>
+            <a:tailEnd type="triangle" w="lg" len="sm"/>
+          </a:ln>
+        </p:spPr>
+        <p:style>
+          <a:lnRef idx="1">
+            <a:schemeClr val="accent1"/>
+          </a:lnRef>
+          <a:fillRef idx="0">
+            <a:schemeClr val="accent1"/>
+          </a:fillRef>
+          <a:effectRef idx="0">
+            <a:schemeClr val="accent1"/>
+          </a:effectRef>
+          <a:fontRef idx="minor">
+            <a:schemeClr val="tx1"/>
+          </a:fontRef>
+        </p:style>
+      </p:cxnSp>
+      <p:sp>
+        <p:nvSpPr>
+          <p:cNvPr id="45" name="TextBox 44">
+            <a:extLst>
+              <a:ext uri="{FF2B5EF4-FFF2-40B4-BE49-F238E27FC236}">
+                <a16:creationId xmlns:a16="http://schemas.microsoft.com/office/drawing/2014/main" id="{4BE1E951-BA68-449E-AD85-E90F144B4D85}"/>
+              </a:ext>
+            </a:extLst>
+          </p:cNvPr>
+          <p:cNvSpPr txBox="1"/>
+          <p:nvPr/>
+        </p:nvSpPr>
+        <p:spPr>
+          <a:xfrm>
+            <a:off x="6650285" y="2972248"/>
+            <a:ext cx="1688796" cy="544765"/>
+          </a:xfrm>
+          <a:prstGeom prst="rect">
+            <a:avLst/>
+          </a:prstGeom>
+          <a:noFill/>
+        </p:spPr>
+        <p:txBody>
+          <a:bodyPr wrap="none" lIns="182880" tIns="146304" rIns="182880" bIns="146304" rtlCol="0">
+            <a:spAutoFit/>
+          </a:bodyPr>
+          <a:lstStyle/>
+          <a:p>
+            <a:pPr>
+              <a:lnSpc>
+                <a:spcPct val="90000"/>
+              </a:lnSpc>
+              <a:spcAft>
+                <a:spcPts val="600"/>
+              </a:spcAft>
+            </a:pPr>
+            <a:r>
+              <a:rPr lang="en-CA" dirty="0">
+                <a:solidFill>
+                  <a:schemeClr val="bg1"/>
+                </a:solidFill>
+              </a:rPr>
+              <a:t>code path #3</a:t>
+            </a:r>
+            <a:endParaRPr lang="en-US" dirty="0" err="1">
+              <a:solidFill>
+                <a:schemeClr val="bg1"/>
+              </a:solidFill>
+            </a:endParaRPr>
+          </a:p>
+        </p:txBody>
+      </p:sp>
+      <p:sp>
+        <p:nvSpPr>
+          <p:cNvPr id="46" name="TextBox 45">
+            <a:extLst>
+              <a:ext uri="{FF2B5EF4-FFF2-40B4-BE49-F238E27FC236}">
+                <a16:creationId xmlns:a16="http://schemas.microsoft.com/office/drawing/2014/main" id="{3961FF2B-8C39-49F7-A7B7-D281F7DDC79B}"/>
+              </a:ext>
+            </a:extLst>
+          </p:cNvPr>
+          <p:cNvSpPr txBox="1"/>
+          <p:nvPr/>
+        </p:nvSpPr>
+        <p:spPr>
+          <a:xfrm>
+            <a:off x="6650285" y="3354697"/>
+            <a:ext cx="1688796" cy="544765"/>
+          </a:xfrm>
+          <a:prstGeom prst="rect">
+            <a:avLst/>
+          </a:prstGeom>
+          <a:noFill/>
+        </p:spPr>
+        <p:txBody>
+          <a:bodyPr wrap="none" lIns="182880" tIns="146304" rIns="182880" bIns="146304" rtlCol="0">
+            <a:spAutoFit/>
+          </a:bodyPr>
+          <a:lstStyle/>
+          <a:p>
+            <a:pPr>
+              <a:lnSpc>
+                <a:spcPct val="90000"/>
+              </a:lnSpc>
+              <a:spcAft>
+                <a:spcPts val="600"/>
+              </a:spcAft>
+            </a:pPr>
+            <a:r>
+              <a:rPr lang="en-CA" dirty="0">
+                <a:solidFill>
+                  <a:schemeClr val="bg1"/>
+                </a:solidFill>
+              </a:rPr>
+              <a:t>code path #4</a:t>
+            </a:r>
+            <a:endParaRPr lang="en-US" dirty="0" err="1">
+              <a:solidFill>
+                <a:schemeClr val="bg1"/>
+              </a:solidFill>
+            </a:endParaRPr>
+          </a:p>
+        </p:txBody>
+      </p:sp>
+      <p:sp>
+        <p:nvSpPr>
+          <p:cNvPr id="47" name="Rectangle: Rounded Corners 46">
+            <a:extLst>
+              <a:ext uri="{FF2B5EF4-FFF2-40B4-BE49-F238E27FC236}">
+                <a16:creationId xmlns:a16="http://schemas.microsoft.com/office/drawing/2014/main" id="{EBEB202D-C0DC-4E35-8DBF-15EA16103505}"/>
               </a:ext>
             </a:extLst>
           </p:cNvPr>
@@ -12172,7 +12441,84 @@
         </p:nvSpPr>
         <p:spPr bwMode="auto">
           <a:xfrm>
-            <a:off x="6434261" y="3461300"/>
+            <a:off x="9268405" y="3078851"/>
+            <a:ext cx="2127424" cy="331559"/>
+          </a:xfrm>
+          <a:prstGeom prst="roundRect">
+            <a:avLst/>
+          </a:prstGeom>
+          <a:solidFill>
+            <a:schemeClr val="bg2">
+              <a:lumMod val="50000"/>
+            </a:schemeClr>
+          </a:solidFill>
+          <a:ln>
+            <a:solidFill>
+              <a:srgbClr val="7030A0"/>
+            </a:solidFill>
+            <a:headEnd type="none" w="med" len="med"/>
+            <a:tailEnd type="none" w="med" len="med"/>
+          </a:ln>
+          <a:effectLst/>
+        </p:spPr>
+        <p:style>
+          <a:lnRef idx="1">
+            <a:schemeClr val="accent2"/>
+          </a:lnRef>
+          <a:fillRef idx="3">
+            <a:schemeClr val="accent2"/>
+          </a:fillRef>
+          <a:effectRef idx="2">
+            <a:schemeClr val="accent2"/>
+          </a:effectRef>
+          <a:fontRef idx="minor">
+            <a:schemeClr val="lt1"/>
+          </a:fontRef>
+        </p:style>
+        <p:txBody>
+          <a:bodyPr rot="0" spcFirstLastPara="0" vertOverflow="overflow" horzOverflow="overflow" vert="horz" wrap="square" lIns="182880" tIns="146304" rIns="182880" bIns="146304" numCol="1" spcCol="0" rtlCol="0" fromWordArt="0" anchor="t" anchorCtr="0" forceAA="0" compatLnSpc="1">
+            <a:prstTxWarp prst="textNoShape">
+              <a:avLst/>
+            </a:prstTxWarp>
+            <a:noAutofit/>
+          </a:bodyPr>
+          <a:lstStyle/>
+          <a:p>
+            <a:pPr algn="ctr" defTabSz="932472" fontAlgn="base">
+              <a:lnSpc>
+                <a:spcPct val="90000"/>
+              </a:lnSpc>
+              <a:spcBef>
+                <a:spcPct val="0"/>
+              </a:spcBef>
+              <a:spcAft>
+                <a:spcPct val="0"/>
+              </a:spcAft>
+            </a:pPr>
+            <a:endParaRPr lang="en-US" sz="1400" dirty="0" err="1">
+              <a:solidFill>
+                <a:srgbClr val="002060"/>
+              </a:solidFill>
+              <a:cs typeface="Segoe UI" pitchFamily="34" charset="0"/>
+            </a:endParaRPr>
+          </a:p>
+        </p:txBody>
+      </p:sp>
+      <p:sp>
+        <p:nvSpPr>
+          <p:cNvPr id="48" name="Rectangle: Rounded Corners 47">
+            <a:extLst>
+              <a:ext uri="{FF2B5EF4-FFF2-40B4-BE49-F238E27FC236}">
+                <a16:creationId xmlns:a16="http://schemas.microsoft.com/office/drawing/2014/main" id="{57B317A3-3AED-4851-89A5-E9CEE06817BC}"/>
+              </a:ext>
+            </a:extLst>
+          </p:cNvPr>
+          <p:cNvSpPr/>
+          <p:nvPr/>
+        </p:nvSpPr>
+        <p:spPr bwMode="auto">
+          <a:xfrm>
+            <a:off x="9274432" y="3461300"/>
             <a:ext cx="2127424" cy="331559"/>
           </a:xfrm>
           <a:prstGeom prst="roundRect">
@@ -12238,10 +12584,10 @@
       </p:sp>
       <p:cxnSp>
         <p:nvCxnSpPr>
-          <p:cNvPr id="43" name="Straight Arrow Connector 42">
-            <a:extLst>
-              <a:ext uri="{FF2B5EF4-FFF2-40B4-BE49-F238E27FC236}">
-                <a16:creationId xmlns:a16="http://schemas.microsoft.com/office/drawing/2014/main" id="{6E7E93C7-C11B-44C8-A8D7-4C0926843C12}"/>
+          <p:cNvPr id="49" name="Straight Arrow Connector 48">
+            <a:extLst>
+              <a:ext uri="{FF2B5EF4-FFF2-40B4-BE49-F238E27FC236}">
+                <a16:creationId xmlns:a16="http://schemas.microsoft.com/office/drawing/2014/main" id="{DAA7A904-B680-4473-9DA3-6EB9F6FB29A5}"/>
               </a:ext>
             </a:extLst>
           </p:cNvPr>
@@ -12250,7 +12596,7 @@
         </p:nvCxnSpPr>
         <p:spPr>
           <a:xfrm>
-            <a:off x="5838741" y="3244630"/>
+            <a:off x="8672885" y="3244630"/>
             <a:ext cx="504056" cy="0"/>
           </a:xfrm>
           <a:prstGeom prst="straightConnector1">
@@ -12280,24 +12626,126 @@
           </a:fontRef>
         </p:style>
       </p:cxnSp>
+      <p:sp>
+        <p:nvSpPr>
+          <p:cNvPr id="50" name="TextBox 49">
+            <a:extLst>
+              <a:ext uri="{FF2B5EF4-FFF2-40B4-BE49-F238E27FC236}">
+                <a16:creationId xmlns:a16="http://schemas.microsoft.com/office/drawing/2014/main" id="{6440FEEC-6E48-4242-98E8-55935F67D6C8}"/>
+              </a:ext>
+            </a:extLst>
+          </p:cNvPr>
+          <p:cNvSpPr txBox="1"/>
+          <p:nvPr/>
+        </p:nvSpPr>
+        <p:spPr>
+          <a:xfrm>
+            <a:off x="9484429" y="2972248"/>
+            <a:ext cx="1558760" cy="544765"/>
+          </a:xfrm>
+          <a:prstGeom prst="rect">
+            <a:avLst/>
+          </a:prstGeom>
+          <a:noFill/>
+        </p:spPr>
+        <p:txBody>
+          <a:bodyPr wrap="none" lIns="182880" tIns="146304" rIns="182880" bIns="146304" rtlCol="0">
+            <a:spAutoFit/>
+          </a:bodyPr>
+          <a:lstStyle/>
+          <a:p>
+            <a:pPr>
+              <a:lnSpc>
+                <a:spcPct val="90000"/>
+              </a:lnSpc>
+              <a:spcAft>
+                <a:spcPts val="600"/>
+              </a:spcAft>
+            </a:pPr>
+            <a:r>
+              <a:rPr lang="en-CA" dirty="0">
+                <a:solidFill>
+                  <a:schemeClr val="bg1"/>
+                </a:solidFill>
+              </a:rPr>
+              <a:t>test path #3</a:t>
+            </a:r>
+            <a:endParaRPr lang="en-US" dirty="0" err="1">
+              <a:solidFill>
+                <a:schemeClr val="bg1"/>
+              </a:solidFill>
+            </a:endParaRPr>
+          </a:p>
+        </p:txBody>
+      </p:sp>
+      <p:sp>
+        <p:nvSpPr>
+          <p:cNvPr id="51" name="TextBox 50">
+            <a:extLst>
+              <a:ext uri="{FF2B5EF4-FFF2-40B4-BE49-F238E27FC236}">
+                <a16:creationId xmlns:a16="http://schemas.microsoft.com/office/drawing/2014/main" id="{EDDE0860-C92F-4128-A7A5-30F4FFC6FB53}"/>
+              </a:ext>
+            </a:extLst>
+          </p:cNvPr>
+          <p:cNvSpPr txBox="1"/>
+          <p:nvPr/>
+        </p:nvSpPr>
+        <p:spPr>
+          <a:xfrm>
+            <a:off x="9484429" y="3342187"/>
+            <a:ext cx="1558760" cy="544765"/>
+          </a:xfrm>
+          <a:prstGeom prst="rect">
+            <a:avLst/>
+          </a:prstGeom>
+          <a:noFill/>
+        </p:spPr>
+        <p:txBody>
+          <a:bodyPr wrap="none" lIns="182880" tIns="146304" rIns="182880" bIns="146304" rtlCol="0">
+            <a:spAutoFit/>
+          </a:bodyPr>
+          <a:lstStyle/>
+          <a:p>
+            <a:pPr>
+              <a:lnSpc>
+                <a:spcPct val="90000"/>
+              </a:lnSpc>
+              <a:spcAft>
+                <a:spcPts val="600"/>
+              </a:spcAft>
+            </a:pPr>
+            <a:r>
+              <a:rPr lang="en-CA" dirty="0">
+                <a:solidFill>
+                  <a:schemeClr val="bg1"/>
+                </a:solidFill>
+              </a:rPr>
+              <a:t>test path #4</a:t>
+            </a:r>
+            <a:endParaRPr lang="en-US" dirty="0" err="1">
+              <a:solidFill>
+                <a:schemeClr val="bg1"/>
+              </a:solidFill>
+            </a:endParaRPr>
+          </a:p>
+        </p:txBody>
+      </p:sp>
       <p:cxnSp>
         <p:nvCxnSpPr>
-          <p:cNvPr id="44" name="Straight Arrow Connector 43">
-            <a:extLst>
-              <a:ext uri="{FF2B5EF4-FFF2-40B4-BE49-F238E27FC236}">
-                <a16:creationId xmlns:a16="http://schemas.microsoft.com/office/drawing/2014/main" id="{56E24C1E-B3C8-4F3E-9E0A-E40677FEA567}"/>
-              </a:ext>
-            </a:extLst>
-          </p:cNvPr>
-          <p:cNvCxnSpPr>
-            <a:cxnSpLocks/>
-          </p:cNvCxnSpPr>
+          <p:cNvPr id="52" name="Straight Arrow Connector 51">
+            <a:extLst>
+              <a:ext uri="{FF2B5EF4-FFF2-40B4-BE49-F238E27FC236}">
+                <a16:creationId xmlns:a16="http://schemas.microsoft.com/office/drawing/2014/main" id="{A9099D22-05DF-4D28-9D64-0DD768CED1BC}"/>
+              </a:ext>
+            </a:extLst>
+          </p:cNvPr>
+          <p:cNvCxnSpPr/>
           <p:nvPr/>
         </p:nvCxnSpPr>
         <p:spPr>
           <a:xfrm>
-            <a:off x="5826662" y="3627079"/>
-            <a:ext cx="516135" cy="0"/>
+            <a:off x="8656781" y="3627079"/>
+            <a:ext cx="504056" cy="0"/>
           </a:xfrm>
           <a:prstGeom prst="straightConnector1">
             <a:avLst/>
@@ -12328,10 +12776,10 @@
       </p:cxnSp>
       <p:sp>
         <p:nvSpPr>
-          <p:cNvPr id="45" name="TextBox 44">
-            <a:extLst>
-              <a:ext uri="{FF2B5EF4-FFF2-40B4-BE49-F238E27FC236}">
-                <a16:creationId xmlns:a16="http://schemas.microsoft.com/office/drawing/2014/main" id="{4BE1E951-BA68-449E-AD85-E90F144B4D85}"/>
+          <p:cNvPr id="53" name="TextBox 52">
+            <a:extLst>
+              <a:ext uri="{FF2B5EF4-FFF2-40B4-BE49-F238E27FC236}">
+                <a16:creationId xmlns:a16="http://schemas.microsoft.com/office/drawing/2014/main" id="{A4B086E6-3715-46DE-9E88-C6B3E6056557}"/>
               </a:ext>
             </a:extLst>
           </p:cNvPr>
@@ -12340,8 +12788,8 @@
         </p:nvSpPr>
         <p:spPr>
           <a:xfrm>
-            <a:off x="6650285" y="2972248"/>
-            <a:ext cx="1688796" cy="544765"/>
+            <a:off x="1158423" y="3391239"/>
+            <a:ext cx="455894" cy="544765"/>
           </a:xfrm>
           <a:prstGeom prst="rect">
             <a:avLst/>
@@ -12368,7 +12816,7 @@
                   <a:schemeClr val="bg1"/>
                 </a:solidFill>
               </a:rPr>
-              <a:t>code path #3</a:t>
+              <a:t>1</a:t>
             </a:r>
             <a:endParaRPr lang="en-US" dirty="0" err="1">
               <a:solidFill>
@@ -12380,62 +12828,10 @@
       </p:sp>
       <p:sp>
         <p:nvSpPr>
-          <p:cNvPr id="46" name="TextBox 45">
-            <a:extLst>
-              <a:ext uri="{FF2B5EF4-FFF2-40B4-BE49-F238E27FC236}">
-                <a16:creationId xmlns:a16="http://schemas.microsoft.com/office/drawing/2014/main" id="{3961FF2B-8C39-49F7-A7B7-D281F7DDC79B}"/>
-              </a:ext>
-            </a:extLst>
-          </p:cNvPr>
-          <p:cNvSpPr txBox="1"/>
-          <p:nvPr/>
-        </p:nvSpPr>
-        <p:spPr>
-          <a:xfrm>
-            <a:off x="6650285" y="3354697"/>
-            <a:ext cx="1688796" cy="544765"/>
-          </a:xfrm>
-          <a:prstGeom prst="rect">
-            <a:avLst/>
-          </a:prstGeom>
-          <a:noFill/>
-        </p:spPr>
-        <p:txBody>
-          <a:bodyPr wrap="none" lIns="182880" tIns="146304" rIns="182880" bIns="146304" rtlCol="0">
-            <a:spAutoFit/>
-          </a:bodyPr>
-          <a:lstStyle/>
-          <a:p>
-            <a:pPr>
-              <a:lnSpc>
-                <a:spcPct val="90000"/>
-              </a:lnSpc>
-              <a:spcAft>
-                <a:spcPts val="600"/>
-              </a:spcAft>
-            </a:pPr>
-            <a:r>
-              <a:rPr lang="en-CA" dirty="0">
-                <a:solidFill>
-                  <a:schemeClr val="bg1"/>
-                </a:solidFill>
-              </a:rPr>
-              <a:t>code path #4</a:t>
-            </a:r>
-            <a:endParaRPr lang="en-US" dirty="0" err="1">
-              <a:solidFill>
-                <a:schemeClr val="bg1"/>
-              </a:solidFill>
-            </a:endParaRPr>
-          </a:p>
-        </p:txBody>
-      </p:sp>
-      <p:sp>
-        <p:nvSpPr>
-          <p:cNvPr id="47" name="Rectangle: Rounded Corners 46">
-            <a:extLst>
-              <a:ext uri="{FF2B5EF4-FFF2-40B4-BE49-F238E27FC236}">
-                <a16:creationId xmlns:a16="http://schemas.microsoft.com/office/drawing/2014/main" id="{EBEB202D-C0DC-4E35-8DBF-15EA16103505}"/>
+          <p:cNvPr id="56" name="Rectangle: Rounded Corners 55">
+            <a:extLst>
+              <a:ext uri="{FF2B5EF4-FFF2-40B4-BE49-F238E27FC236}">
+                <a16:creationId xmlns:a16="http://schemas.microsoft.com/office/drawing/2014/main" id="{D469706A-A9F4-454E-A38E-4AF77229579A}"/>
               </a:ext>
             </a:extLst>
           </p:cNvPr>
@@ -12444,7 +12840,7 @@
         </p:nvSpPr>
         <p:spPr bwMode="auto">
           <a:xfrm>
-            <a:off x="9268405" y="3078851"/>
+            <a:off x="6434261" y="3843748"/>
             <a:ext cx="2127424" cy="331559"/>
           </a:xfrm>
           <a:prstGeom prst="roundRect">
@@ -12500,18 +12896,63 @@
               <a:solidFill>
                 <a:srgbClr val="002060"/>
               </a:solidFill>
-              <a:ea typeface="Segoe UI" pitchFamily="34" charset="0"/>
               <a:cs typeface="Segoe UI" pitchFamily="34" charset="0"/>
             </a:endParaRPr>
           </a:p>
         </p:txBody>
       </p:sp>
-      <p:sp>
-        <p:nvSpPr>
-          <p:cNvPr id="48" name="Rectangle: Rounded Corners 47">
-            <a:extLst>
-              <a:ext uri="{FF2B5EF4-FFF2-40B4-BE49-F238E27FC236}">
-                <a16:creationId xmlns:a16="http://schemas.microsoft.com/office/drawing/2014/main" id="{57B317A3-3AED-4851-89A5-E9CEE06817BC}"/>
+      <p:cxnSp>
+        <p:nvCxnSpPr>
+          <p:cNvPr id="57" name="Straight Arrow Connector 56">
+            <a:extLst>
+              <a:ext uri="{FF2B5EF4-FFF2-40B4-BE49-F238E27FC236}">
+                <a16:creationId xmlns:a16="http://schemas.microsoft.com/office/drawing/2014/main" id="{14953CA4-A583-43F6-8E77-A59D11B6E9F2}"/>
+              </a:ext>
+            </a:extLst>
+          </p:cNvPr>
+          <p:cNvCxnSpPr>
+            <a:cxnSpLocks/>
+          </p:cNvCxnSpPr>
+          <p:nvPr/>
+        </p:nvCxnSpPr>
+        <p:spPr>
+          <a:xfrm>
+            <a:off x="4274021" y="4009527"/>
+            <a:ext cx="2068776" cy="0"/>
+          </a:xfrm>
+          <a:prstGeom prst="straightConnector1">
+            <a:avLst/>
+          </a:prstGeom>
+          <a:ln>
+            <a:solidFill>
+              <a:schemeClr val="tx1"/>
+            </a:solidFill>
+            <a:prstDash val="dash"/>
+            <a:headEnd type="none"/>
+            <a:tailEnd type="triangle" w="lg" len="sm"/>
+          </a:ln>
+        </p:spPr>
+        <p:style>
+          <a:lnRef idx="1">
+            <a:schemeClr val="accent1"/>
+          </a:lnRef>
+          <a:fillRef idx="0">
+            <a:schemeClr val="accent1"/>
+          </a:fillRef>
+          <a:effectRef idx="0">
+            <a:schemeClr val="accent1"/>
+          </a:effectRef>
+          <a:fontRef idx="minor">
+            <a:schemeClr val="tx1"/>
+          </a:fontRef>
+        </p:style>
+      </p:cxnSp>
+      <p:sp>
+        <p:nvSpPr>
+          <p:cNvPr id="58" name="Rectangle: Rounded Corners 57">
+            <a:extLst>
+              <a:ext uri="{FF2B5EF4-FFF2-40B4-BE49-F238E27FC236}">
+                <a16:creationId xmlns:a16="http://schemas.microsoft.com/office/drawing/2014/main" id="{EB40A4BC-83D2-4085-9356-D147B5B5BBFA}"/>
               </a:ext>
             </a:extLst>
           </p:cNvPr>
@@ -12520,16 +12961,14 @@
         </p:nvSpPr>
         <p:spPr bwMode="auto">
           <a:xfrm>
-            <a:off x="9274432" y="3461300"/>
+            <a:off x="9274432" y="3843748"/>
             <a:ext cx="2127424" cy="331559"/>
           </a:xfrm>
           <a:prstGeom prst="roundRect">
             <a:avLst/>
           </a:prstGeom>
           <a:solidFill>
-            <a:schemeClr val="bg2">
-              <a:lumMod val="50000"/>
-            </a:schemeClr>
+            <a:srgbClr val="008000"/>
           </a:solidFill>
           <a:ln>
             <a:solidFill>
@@ -12578,7 +13017,6 @@
               <a:solidFill>
                 <a:srgbClr val="002060"/>
               </a:solidFill>
-              <a:ea typeface="Segoe UI" pitchFamily="34" charset="0"/>
               <a:cs typeface="Segoe UI" pitchFamily="34" charset="0"/>
             </a:endParaRPr>
           </a:p>
@@ -12586,10 +13024,10 @@
       </p:sp>
       <p:cxnSp>
         <p:nvCxnSpPr>
-          <p:cNvPr id="49" name="Straight Arrow Connector 48">
-            <a:extLst>
-              <a:ext uri="{FF2B5EF4-FFF2-40B4-BE49-F238E27FC236}">
-                <a16:creationId xmlns:a16="http://schemas.microsoft.com/office/drawing/2014/main" id="{DAA7A904-B680-4473-9DA3-6EB9F6FB29A5}"/>
+          <p:cNvPr id="59" name="Straight Arrow Connector 58">
+            <a:extLst>
+              <a:ext uri="{FF2B5EF4-FFF2-40B4-BE49-F238E27FC236}">
+                <a16:creationId xmlns:a16="http://schemas.microsoft.com/office/drawing/2014/main" id="{3C334998-8187-4529-97C1-46058948D3D9}"/>
               </a:ext>
             </a:extLst>
           </p:cNvPr>
@@ -12598,7 +13036,7 @@
         </p:nvCxnSpPr>
         <p:spPr>
           <a:xfrm>
-            <a:off x="8672885" y="3244630"/>
+            <a:off x="8656781" y="4009527"/>
             <a:ext cx="504056" cy="0"/>
           </a:xfrm>
           <a:prstGeom prst="straightConnector1">
@@ -12630,10 +13068,10 @@
       </p:cxnSp>
       <p:sp>
         <p:nvSpPr>
-          <p:cNvPr id="50" name="TextBox 49">
-            <a:extLst>
-              <a:ext uri="{FF2B5EF4-FFF2-40B4-BE49-F238E27FC236}">
-                <a16:creationId xmlns:a16="http://schemas.microsoft.com/office/drawing/2014/main" id="{6440FEEC-6E48-4242-98E8-55935F67D6C8}"/>
+          <p:cNvPr id="60" name="TextBox 59">
+            <a:extLst>
+              <a:ext uri="{FF2B5EF4-FFF2-40B4-BE49-F238E27FC236}">
+                <a16:creationId xmlns:a16="http://schemas.microsoft.com/office/drawing/2014/main" id="{0048F406-A7A6-40AA-98BB-C82F7D6FD2F7}"/>
               </a:ext>
             </a:extLst>
           </p:cNvPr>
@@ -12642,8 +13080,8 @@
         </p:nvSpPr>
         <p:spPr>
           <a:xfrm>
-            <a:off x="9484429" y="2972248"/>
-            <a:ext cx="1558760" cy="544765"/>
+            <a:off x="6657278" y="3723566"/>
+            <a:ext cx="1688796" cy="544765"/>
           </a:xfrm>
           <a:prstGeom prst="rect">
             <a:avLst/>
@@ -12670,7 +13108,7 @@
                   <a:schemeClr val="bg1"/>
                 </a:solidFill>
               </a:rPr>
-              <a:t>test path #3</a:t>
+              <a:t>code path #5</a:t>
             </a:r>
             <a:endParaRPr lang="en-US" dirty="0" err="1">
               <a:solidFill>
@@ -12682,10 +13120,10 @@
       </p:sp>
       <p:sp>
         <p:nvSpPr>
-          <p:cNvPr id="51" name="TextBox 50">
-            <a:extLst>
-              <a:ext uri="{FF2B5EF4-FFF2-40B4-BE49-F238E27FC236}">
-                <a16:creationId xmlns:a16="http://schemas.microsoft.com/office/drawing/2014/main" id="{EDDE0860-C92F-4128-A7A5-30F4FFC6FB53}"/>
+          <p:cNvPr id="61" name="TextBox 60">
+            <a:extLst>
+              <a:ext uri="{FF2B5EF4-FFF2-40B4-BE49-F238E27FC236}">
+                <a16:creationId xmlns:a16="http://schemas.microsoft.com/office/drawing/2014/main" id="{1B88C699-DA3D-4155-8C73-F3480AB10AF8}"/>
               </a:ext>
             </a:extLst>
           </p:cNvPr>
@@ -12694,453 +13132,7 @@
         </p:nvSpPr>
         <p:spPr>
           <a:xfrm>
-            <a:off x="9484429" y="3342187"/>
-            <a:ext cx="1558760" cy="544765"/>
-          </a:xfrm>
-          <a:prstGeom prst="rect">
-            <a:avLst/>
-          </a:prstGeom>
-          <a:noFill/>
-        </p:spPr>
-        <p:txBody>
-          <a:bodyPr wrap="none" lIns="182880" tIns="146304" rIns="182880" bIns="146304" rtlCol="0">
-            <a:spAutoFit/>
-          </a:bodyPr>
-          <a:lstStyle/>
-          <a:p>
-            <a:pPr>
-              <a:lnSpc>
-                <a:spcPct val="90000"/>
-              </a:lnSpc>
-              <a:spcAft>
-                <a:spcPts val="600"/>
-              </a:spcAft>
-            </a:pPr>
-            <a:r>
-              <a:rPr lang="en-CA" dirty="0">
-                <a:solidFill>
-                  <a:schemeClr val="bg1"/>
-                </a:solidFill>
-              </a:rPr>
-              <a:t>test path #4</a:t>
-            </a:r>
-            <a:endParaRPr lang="en-US" dirty="0" err="1">
-              <a:solidFill>
-                <a:schemeClr val="bg1"/>
-              </a:solidFill>
-            </a:endParaRPr>
-          </a:p>
-        </p:txBody>
-      </p:sp>
-      <p:cxnSp>
-        <p:nvCxnSpPr>
-          <p:cNvPr id="52" name="Straight Arrow Connector 51">
-            <a:extLst>
-              <a:ext uri="{FF2B5EF4-FFF2-40B4-BE49-F238E27FC236}">
-                <a16:creationId xmlns:a16="http://schemas.microsoft.com/office/drawing/2014/main" id="{A9099D22-05DF-4D28-9D64-0DD768CED1BC}"/>
-              </a:ext>
-            </a:extLst>
-          </p:cNvPr>
-          <p:cNvCxnSpPr/>
-          <p:nvPr/>
-        </p:nvCxnSpPr>
-        <p:spPr>
-          <a:xfrm>
-            <a:off x="8656781" y="3627079"/>
-            <a:ext cx="504056" cy="0"/>
-          </a:xfrm>
-          <a:prstGeom prst="straightConnector1">
-            <a:avLst/>
-          </a:prstGeom>
-          <a:ln>
-            <a:solidFill>
-              <a:schemeClr val="tx1"/>
-            </a:solidFill>
-            <a:prstDash val="dash"/>
-            <a:headEnd type="none"/>
-            <a:tailEnd type="triangle" w="lg" len="sm"/>
-          </a:ln>
-        </p:spPr>
-        <p:style>
-          <a:lnRef idx="1">
-            <a:schemeClr val="accent1"/>
-          </a:lnRef>
-          <a:fillRef idx="0">
-            <a:schemeClr val="accent1"/>
-          </a:fillRef>
-          <a:effectRef idx="0">
-            <a:schemeClr val="accent1"/>
-          </a:effectRef>
-          <a:fontRef idx="minor">
-            <a:schemeClr val="tx1"/>
-          </a:fontRef>
-        </p:style>
-      </p:cxnSp>
-      <p:sp>
-        <p:nvSpPr>
-          <p:cNvPr id="53" name="TextBox 52">
-            <a:extLst>
-              <a:ext uri="{FF2B5EF4-FFF2-40B4-BE49-F238E27FC236}">
-                <a16:creationId xmlns:a16="http://schemas.microsoft.com/office/drawing/2014/main" id="{A4B086E6-3715-46DE-9E88-C6B3E6056557}"/>
-              </a:ext>
-            </a:extLst>
-          </p:cNvPr>
-          <p:cNvSpPr txBox="1"/>
-          <p:nvPr/>
-        </p:nvSpPr>
-        <p:spPr>
-          <a:xfrm>
-            <a:off x="1158423" y="3391239"/>
-            <a:ext cx="455894" cy="544765"/>
-          </a:xfrm>
-          <a:prstGeom prst="rect">
-            <a:avLst/>
-          </a:prstGeom>
-          <a:noFill/>
-        </p:spPr>
-        <p:txBody>
-          <a:bodyPr wrap="none" lIns="182880" tIns="146304" rIns="182880" bIns="146304" rtlCol="0">
-            <a:spAutoFit/>
-          </a:bodyPr>
-          <a:lstStyle/>
-          <a:p>
-            <a:pPr>
-              <a:lnSpc>
-                <a:spcPct val="90000"/>
-              </a:lnSpc>
-              <a:spcAft>
-                <a:spcPts val="600"/>
-              </a:spcAft>
-            </a:pPr>
-            <a:r>
-              <a:rPr lang="en-CA" dirty="0">
-                <a:solidFill>
-                  <a:schemeClr val="bg1"/>
-                </a:solidFill>
-              </a:rPr>
-              <a:t>1</a:t>
-            </a:r>
-            <a:endParaRPr lang="en-US" dirty="0" err="1">
-              <a:solidFill>
-                <a:schemeClr val="bg1"/>
-              </a:solidFill>
-            </a:endParaRPr>
-          </a:p>
-        </p:txBody>
-      </p:sp>
-      <p:sp>
-        <p:nvSpPr>
-          <p:cNvPr id="56" name="Rectangle: Rounded Corners 55">
-            <a:extLst>
-              <a:ext uri="{FF2B5EF4-FFF2-40B4-BE49-F238E27FC236}">
-                <a16:creationId xmlns:a16="http://schemas.microsoft.com/office/drawing/2014/main" id="{D469706A-A9F4-454E-A38E-4AF77229579A}"/>
-              </a:ext>
-            </a:extLst>
-          </p:cNvPr>
-          <p:cNvSpPr/>
-          <p:nvPr/>
-        </p:nvSpPr>
-        <p:spPr bwMode="auto">
-          <a:xfrm>
-            <a:off x="6434261" y="3843748"/>
-            <a:ext cx="2127424" cy="331559"/>
-          </a:xfrm>
-          <a:prstGeom prst="roundRect">
-            <a:avLst/>
-          </a:prstGeom>
-          <a:solidFill>
-            <a:schemeClr val="bg2">
-              <a:lumMod val="50000"/>
-            </a:schemeClr>
-          </a:solidFill>
-          <a:ln>
-            <a:solidFill>
-              <a:srgbClr val="7030A0"/>
-            </a:solidFill>
-            <a:headEnd type="none" w="med" len="med"/>
-            <a:tailEnd type="none" w="med" len="med"/>
-          </a:ln>
-          <a:effectLst/>
-        </p:spPr>
-        <p:style>
-          <a:lnRef idx="1">
-            <a:schemeClr val="accent2"/>
-          </a:lnRef>
-          <a:fillRef idx="3">
-            <a:schemeClr val="accent2"/>
-          </a:fillRef>
-          <a:effectRef idx="2">
-            <a:schemeClr val="accent2"/>
-          </a:effectRef>
-          <a:fontRef idx="minor">
-            <a:schemeClr val="lt1"/>
-          </a:fontRef>
-        </p:style>
-        <p:txBody>
-          <a:bodyPr rot="0" spcFirstLastPara="0" vertOverflow="overflow" horzOverflow="overflow" vert="horz" wrap="square" lIns="182880" tIns="146304" rIns="182880" bIns="146304" numCol="1" spcCol="0" rtlCol="0" fromWordArt="0" anchor="t" anchorCtr="0" forceAA="0" compatLnSpc="1">
-            <a:prstTxWarp prst="textNoShape">
-              <a:avLst/>
-            </a:prstTxWarp>
-            <a:noAutofit/>
-          </a:bodyPr>
-          <a:lstStyle/>
-          <a:p>
-            <a:pPr algn="ctr" defTabSz="932472" fontAlgn="base">
-              <a:lnSpc>
-                <a:spcPct val="90000"/>
-              </a:lnSpc>
-              <a:spcBef>
-                <a:spcPct val="0"/>
-              </a:spcBef>
-              <a:spcAft>
-                <a:spcPct val="0"/>
-              </a:spcAft>
-            </a:pPr>
-            <a:endParaRPr lang="en-US" sz="1400" dirty="0" err="1">
-              <a:solidFill>
-                <a:srgbClr val="002060"/>
-              </a:solidFill>
-              <a:ea typeface="Segoe UI" pitchFamily="34" charset="0"/>
-              <a:cs typeface="Segoe UI" pitchFamily="34" charset="0"/>
-            </a:endParaRPr>
-          </a:p>
-        </p:txBody>
-      </p:sp>
-      <p:cxnSp>
-        <p:nvCxnSpPr>
-          <p:cNvPr id="57" name="Straight Arrow Connector 56">
-            <a:extLst>
-              <a:ext uri="{FF2B5EF4-FFF2-40B4-BE49-F238E27FC236}">
-                <a16:creationId xmlns:a16="http://schemas.microsoft.com/office/drawing/2014/main" id="{14953CA4-A583-43F6-8E77-A59D11B6E9F2}"/>
-              </a:ext>
-            </a:extLst>
-          </p:cNvPr>
-          <p:cNvCxnSpPr>
-            <a:cxnSpLocks/>
-          </p:cNvCxnSpPr>
-          <p:nvPr/>
-        </p:nvCxnSpPr>
-        <p:spPr>
-          <a:xfrm>
-            <a:off x="4274021" y="4009527"/>
-            <a:ext cx="2068776" cy="0"/>
-          </a:xfrm>
-          <a:prstGeom prst="straightConnector1">
-            <a:avLst/>
-          </a:prstGeom>
-          <a:ln>
-            <a:solidFill>
-              <a:schemeClr val="tx1"/>
-            </a:solidFill>
-            <a:prstDash val="dash"/>
-            <a:headEnd type="none"/>
-            <a:tailEnd type="triangle" w="lg" len="sm"/>
-          </a:ln>
-        </p:spPr>
-        <p:style>
-          <a:lnRef idx="1">
-            <a:schemeClr val="accent1"/>
-          </a:lnRef>
-          <a:fillRef idx="0">
-            <a:schemeClr val="accent1"/>
-          </a:fillRef>
-          <a:effectRef idx="0">
-            <a:schemeClr val="accent1"/>
-          </a:effectRef>
-          <a:fontRef idx="minor">
-            <a:schemeClr val="tx1"/>
-          </a:fontRef>
-        </p:style>
-      </p:cxnSp>
-      <p:sp>
-        <p:nvSpPr>
-          <p:cNvPr id="58" name="Rectangle: Rounded Corners 57">
-            <a:extLst>
-              <a:ext uri="{FF2B5EF4-FFF2-40B4-BE49-F238E27FC236}">
-                <a16:creationId xmlns:a16="http://schemas.microsoft.com/office/drawing/2014/main" id="{EB40A4BC-83D2-4085-9356-D147B5B5BBFA}"/>
-              </a:ext>
-            </a:extLst>
-          </p:cNvPr>
-          <p:cNvSpPr/>
-          <p:nvPr/>
-        </p:nvSpPr>
-        <p:spPr bwMode="auto">
-          <a:xfrm>
-            <a:off x="9274432" y="3843748"/>
-            <a:ext cx="2127424" cy="331559"/>
-          </a:xfrm>
-          <a:prstGeom prst="roundRect">
-            <a:avLst/>
-          </a:prstGeom>
-          <a:solidFill>
-            <a:schemeClr val="bg2">
-              <a:lumMod val="50000"/>
-            </a:schemeClr>
-          </a:solidFill>
-          <a:ln>
-            <a:solidFill>
-              <a:srgbClr val="7030A0"/>
-            </a:solidFill>
-            <a:headEnd type="none" w="med" len="med"/>
-            <a:tailEnd type="none" w="med" len="med"/>
-          </a:ln>
-          <a:effectLst/>
-        </p:spPr>
-        <p:style>
-          <a:lnRef idx="1">
-            <a:schemeClr val="accent2"/>
-          </a:lnRef>
-          <a:fillRef idx="3">
-            <a:schemeClr val="accent2"/>
-          </a:fillRef>
-          <a:effectRef idx="2">
-            <a:schemeClr val="accent2"/>
-          </a:effectRef>
-          <a:fontRef idx="minor">
-            <a:schemeClr val="lt1"/>
-          </a:fontRef>
-        </p:style>
-        <p:txBody>
-          <a:bodyPr rot="0" spcFirstLastPara="0" vertOverflow="overflow" horzOverflow="overflow" vert="horz" wrap="square" lIns="182880" tIns="146304" rIns="182880" bIns="146304" numCol="1" spcCol="0" rtlCol="0" fromWordArt="0" anchor="t" anchorCtr="0" forceAA="0" compatLnSpc="1">
-            <a:prstTxWarp prst="textNoShape">
-              <a:avLst/>
-            </a:prstTxWarp>
-            <a:noAutofit/>
-          </a:bodyPr>
-          <a:lstStyle/>
-          <a:p>
-            <a:pPr algn="ctr" defTabSz="932472" fontAlgn="base">
-              <a:lnSpc>
-                <a:spcPct val="90000"/>
-              </a:lnSpc>
-              <a:spcBef>
-                <a:spcPct val="0"/>
-              </a:spcBef>
-              <a:spcAft>
-                <a:spcPct val="0"/>
-              </a:spcAft>
-            </a:pPr>
-            <a:endParaRPr lang="en-US" sz="1400" dirty="0" err="1">
-              <a:solidFill>
-                <a:srgbClr val="002060"/>
-              </a:solidFill>
-              <a:ea typeface="Segoe UI" pitchFamily="34" charset="0"/>
-              <a:cs typeface="Segoe UI" pitchFamily="34" charset="0"/>
-            </a:endParaRPr>
-          </a:p>
-        </p:txBody>
-      </p:sp>
-      <p:cxnSp>
-        <p:nvCxnSpPr>
-          <p:cNvPr id="59" name="Straight Arrow Connector 58">
-            <a:extLst>
-              <a:ext uri="{FF2B5EF4-FFF2-40B4-BE49-F238E27FC236}">
-                <a16:creationId xmlns:a16="http://schemas.microsoft.com/office/drawing/2014/main" id="{3C334998-8187-4529-97C1-46058948D3D9}"/>
-              </a:ext>
-            </a:extLst>
-          </p:cNvPr>
-          <p:cNvCxnSpPr/>
-          <p:nvPr/>
-        </p:nvCxnSpPr>
-        <p:spPr>
-          <a:xfrm>
-            <a:off x="8656781" y="4009527"/>
-            <a:ext cx="504056" cy="0"/>
-          </a:xfrm>
-          <a:prstGeom prst="straightConnector1">
-            <a:avLst/>
-          </a:prstGeom>
-          <a:ln>
-            <a:solidFill>
-              <a:schemeClr val="tx1"/>
-            </a:solidFill>
-            <a:prstDash val="dash"/>
-            <a:headEnd type="none"/>
-            <a:tailEnd type="triangle" w="lg" len="sm"/>
-          </a:ln>
-        </p:spPr>
-        <p:style>
-          <a:lnRef idx="1">
-            <a:schemeClr val="accent1"/>
-          </a:lnRef>
-          <a:fillRef idx="0">
-            <a:schemeClr val="accent1"/>
-          </a:fillRef>
-          <a:effectRef idx="0">
-            <a:schemeClr val="accent1"/>
-          </a:effectRef>
-          <a:fontRef idx="minor">
-            <a:schemeClr val="tx1"/>
-          </a:fontRef>
-        </p:style>
-      </p:cxnSp>
-      <p:sp>
-        <p:nvSpPr>
-          <p:cNvPr id="60" name="TextBox 59">
-            <a:extLst>
-              <a:ext uri="{FF2B5EF4-FFF2-40B4-BE49-F238E27FC236}">
-                <a16:creationId xmlns:a16="http://schemas.microsoft.com/office/drawing/2014/main" id="{0048F406-A7A6-40AA-98BB-C82F7D6FD2F7}"/>
-              </a:ext>
-            </a:extLst>
-          </p:cNvPr>
-          <p:cNvSpPr txBox="1"/>
-          <p:nvPr/>
-        </p:nvSpPr>
-        <p:spPr>
-          <a:xfrm>
-            <a:off x="6657278" y="3723566"/>
-            <a:ext cx="1688796" cy="544765"/>
-          </a:xfrm>
-          <a:prstGeom prst="rect">
-            <a:avLst/>
-          </a:prstGeom>
-          <a:noFill/>
-        </p:spPr>
-        <p:txBody>
-          <a:bodyPr wrap="none" lIns="182880" tIns="146304" rIns="182880" bIns="146304" rtlCol="0">
-            <a:spAutoFit/>
-          </a:bodyPr>
-          <a:lstStyle/>
-          <a:p>
-            <a:pPr>
-              <a:lnSpc>
-                <a:spcPct val="90000"/>
-              </a:lnSpc>
-              <a:spcAft>
-                <a:spcPts val="600"/>
-              </a:spcAft>
-            </a:pPr>
-            <a:r>
-              <a:rPr lang="en-CA" dirty="0">
-                <a:solidFill>
-                  <a:schemeClr val="bg1"/>
-                </a:solidFill>
-              </a:rPr>
-              <a:t>code path #5</a:t>
-            </a:r>
-            <a:endParaRPr lang="en-US" dirty="0" err="1">
-              <a:solidFill>
-                <a:schemeClr val="bg1"/>
-              </a:solidFill>
-            </a:endParaRPr>
-          </a:p>
-        </p:txBody>
-      </p:sp>
-      <p:sp>
-        <p:nvSpPr>
-          <p:cNvPr id="61" name="TextBox 60">
-            <a:extLst>
-              <a:ext uri="{FF2B5EF4-FFF2-40B4-BE49-F238E27FC236}">
-                <a16:creationId xmlns:a16="http://schemas.microsoft.com/office/drawing/2014/main" id="{1B88C699-DA3D-4155-8C73-F3480AB10AF8}"/>
-              </a:ext>
-            </a:extLst>
-          </p:cNvPr>
-          <p:cNvSpPr txBox="1"/>
-          <p:nvPr/>
-        </p:nvSpPr>
-        <p:spPr>
-          <a:xfrm>
-            <a:off x="9491422" y="3711056"/>
+            <a:off x="9491422" y="3737144"/>
             <a:ext cx="1558760" cy="544765"/>
           </a:xfrm>
           <a:prstGeom prst="rect">
@@ -14516,7 +14508,7 @@
         <p:spPr>
           <a:xfrm>
             <a:off x="7714693" y="4417580"/>
-            <a:ext cx="3681136" cy="544765"/>
+            <a:ext cx="3762890" cy="544765"/>
           </a:xfrm>
           <a:prstGeom prst="rect">
             <a:avLst/>
@@ -14540,12 +14532,20 @@
               </a:spcAft>
             </a:pPr>
             <a:r>
+              <a:rPr lang="en-CA">
+                <a:solidFill>
+                  <a:srgbClr val="C00000"/>
+                </a:solidFill>
+              </a:rPr>
+              <a:t>dependency on </a:t>
+            </a:r>
+            <a:r>
               <a:rPr lang="en-CA" dirty="0">
                 <a:solidFill>
                   <a:srgbClr val="C00000"/>
                 </a:solidFill>
               </a:rPr>
-              <a:t>dependency in feature </a:t>
+              <a:t>feature </a:t>
             </a:r>
             <a:r>
               <a:rPr lang="en-CA" dirty="0">

</xml_diff>